<commit_message>
add stationary-distribution.pptx, edit random-walks.pptx page-rank.pptx
</commit_message>
<xml_diff>
--- a/fall13/slidesF13/page-rank.pptx
+++ b/fall13/slidesF13/page-rank.pptx
@@ -5,18 +5,17 @@
     <p:sldMasterId id="2147483648" r:id="rId1"/>
   </p:sldMasterIdLst>
   <p:notesMasterIdLst>
-    <p:notesMasterId r:id="rId8"/>
+    <p:notesMasterId r:id="rId7"/>
   </p:notesMasterIdLst>
   <p:handoutMasterIdLst>
-    <p:handoutMasterId r:id="rId9"/>
+    <p:handoutMasterId r:id="rId8"/>
   </p:handoutMasterIdLst>
   <p:sldIdLst>
     <p:sldId id="333" r:id="rId2"/>
     <p:sldId id="332" r:id="rId3"/>
     <p:sldId id="296" r:id="rId4"/>
     <p:sldId id="335" r:id="rId5"/>
-    <p:sldId id="336" r:id="rId6"/>
-    <p:sldId id="337" r:id="rId7"/>
+    <p:sldId id="337" r:id="rId6"/>
   </p:sldIdLst>
   <p:sldSz cx="9144000" cy="6858000" type="screen4x3"/>
   <p:notesSz cx="9601200" cy="7315200"/>
@@ -4342,27 +4341,7 @@
             </a:r>
             <a:r>
               <a:rPr lang="en-US" sz="4000" dirty="0"/>
-              <a:t> {</a:t>
-            </a:r>
-            <a:r>
-              <a:rPr lang="en-US" sz="4000" dirty="0" err="1">
-                <a:solidFill>
-                  <a:schemeClr val="accent2"/>
-                </a:solidFill>
-              </a:rPr>
-              <a:t>p</a:t>
-            </a:r>
-            <a:r>
-              <a:rPr lang="en-US" sz="4000" baseline="-25000" dirty="0" err="1">
-                <a:solidFill>
-                  <a:srgbClr val="0000FF"/>
-                </a:solidFill>
-              </a:rPr>
-              <a:t>u</a:t>
-            </a:r>
-            <a:r>
-              <a:rPr lang="en-US" sz="4000" dirty="0"/>
-              <a:t>}</a:t>
+              <a:t> </a:t>
             </a:r>
           </a:p>
           <a:p>
@@ -4378,7 +4357,7 @@
               <a:t>Rank </a:t>
             </a:r>
             <a:r>
-              <a:rPr lang="en-US" sz="4000" dirty="0" err="1">
+              <a:rPr lang="en-US" sz="4000" dirty="0">
                 <a:solidFill>
                   <a:srgbClr val="0000FF"/>
                 </a:solidFill>
@@ -4395,30 +4374,22 @@
                   <a:srgbClr val="0000FF"/>
                 </a:solidFill>
               </a:rPr>
-              <a:t> </a:t>
-            </a:r>
-            <a:r>
-              <a:rPr lang="en-US" sz="4000" dirty="0" err="1">
+              <a:t> v</a:t>
+            </a:r>
+            <a:r>
+              <a:rPr lang="en-US" sz="4000" dirty="0"/>
+              <a:t> if </a:t>
+            </a:r>
+            <a:r>
+              <a:rPr lang="en-US" sz="4000" dirty="0" err="1" smtClean="0">
                 <a:solidFill>
                   <a:srgbClr val="0000FF"/>
                 </a:solidFill>
               </a:rPr>
-              <a:t>v</a:t>
-            </a:r>
-            <a:r>
-              <a:rPr lang="en-US" sz="4000" dirty="0"/>
-              <a:t> if </a:t>
-            </a:r>
-            <a:r>
-              <a:rPr lang="en-US" sz="4000" dirty="0" err="1">
-                <a:solidFill>
-                  <a:srgbClr val="0000FF"/>
-                </a:solidFill>
-              </a:rPr>
-              <a:t>p</a:t>
-            </a:r>
-            <a:r>
-              <a:rPr lang="en-US" sz="4000" baseline="-25000" dirty="0" err="1">
+              <a:t>s</a:t>
+            </a:r>
+            <a:r>
+              <a:rPr lang="en-US" sz="4000" baseline="-25000" dirty="0" err="1" smtClean="0">
                 <a:solidFill>
                   <a:srgbClr val="0000FF"/>
                 </a:solidFill>
@@ -4426,7 +4397,7 @@
               <a:t>u</a:t>
             </a:r>
             <a:r>
-              <a:rPr lang="en-US" sz="4000" dirty="0">
+              <a:rPr lang="en-US" sz="4000" dirty="0" smtClean="0">
                 <a:solidFill>
                   <a:schemeClr val="accent2"/>
                 </a:solidFill>
@@ -4452,15 +4423,15 @@
               <a:t> </a:t>
             </a:r>
             <a:r>
-              <a:rPr lang="en-US" sz="4000" dirty="0" err="1">
+              <a:rPr lang="en-US" sz="4000" dirty="0" err="1" smtClean="0">
                 <a:solidFill>
                   <a:srgbClr val="0000FF"/>
                 </a:solidFill>
               </a:rPr>
-              <a:t>p</a:t>
-            </a:r>
-            <a:r>
-              <a:rPr lang="en-US" sz="4000" baseline="-25000" dirty="0" err="1">
+              <a:t>s</a:t>
+            </a:r>
+            <a:r>
+              <a:rPr lang="en-US" sz="4000" baseline="-25000" dirty="0" err="1" smtClean="0">
                 <a:solidFill>
                   <a:srgbClr val="0000FF"/>
                 </a:solidFill>
@@ -4555,6 +4526,84 @@
           </a:p>
         </p:txBody>
       </p:sp>
+      <p:grpSp>
+        <p:nvGrpSpPr>
+          <p:cNvPr id="6" name="Group 5"/>
+          <p:cNvGrpSpPr/>
+          <p:nvPr/>
+        </p:nvGrpSpPr>
+        <p:grpSpPr>
+          <a:xfrm>
+            <a:off x="7162800" y="4191000"/>
+            <a:ext cx="521785" cy="923330"/>
+            <a:chOff x="1981200" y="4572000"/>
+            <a:chExt cx="521785" cy="923330"/>
+          </a:xfrm>
+        </p:grpSpPr>
+        <p:sp>
+          <p:nvSpPr>
+            <p:cNvPr id="9" name="TextBox 8"/>
+            <p:cNvSpPr txBox="1"/>
+            <p:nvPr/>
+          </p:nvSpPr>
+          <p:spPr>
+            <a:xfrm>
+              <a:off x="1981200" y="4572000"/>
+              <a:ext cx="521785" cy="923330"/>
+            </a:xfrm>
+            <a:prstGeom prst="rect">
+              <a:avLst/>
+            </a:prstGeom>
+            <a:noFill/>
+          </p:spPr>
+          <p:txBody>
+            <a:bodyPr wrap="none" rtlCol="0">
+              <a:spAutoFit/>
+            </a:bodyPr>
+            <a:lstStyle/>
+            <a:p>
+              <a:r>
+                <a:rPr lang="en-US" sz="5400" b="1" dirty="0">
+                  <a:solidFill>
+                    <a:srgbClr val="0000FF"/>
+                  </a:solidFill>
+                </a:rPr>
+                <a:t>s</a:t>
+              </a:r>
+              <a:endParaRPr lang="en-US" sz="5400" dirty="0"/>
+            </a:p>
+          </p:txBody>
+        </p:sp>
+        <p:cxnSp>
+          <p:nvCxnSpPr>
+            <p:cNvPr id="10" name="Straight Arrow Connector 9"/>
+            <p:cNvCxnSpPr/>
+            <p:nvPr/>
+          </p:nvCxnSpPr>
+          <p:spPr bwMode="auto">
+            <a:xfrm>
+              <a:off x="2057400" y="4800600"/>
+              <a:ext cx="381000" cy="0"/>
+            </a:xfrm>
+            <a:prstGeom prst="straightConnector1">
+              <a:avLst/>
+            </a:prstGeom>
+            <a:solidFill>
+              <a:schemeClr val="accent1"/>
+            </a:solidFill>
+            <a:ln w="38100" cap="flat" cmpd="sng" algn="ctr">
+              <a:solidFill>
+                <a:srgbClr val="0000FF"/>
+              </a:solidFill>
+              <a:prstDash val="solid"/>
+              <a:round/>
+              <a:headEnd type="none" w="med" len="med"/>
+              <a:tailEnd type="arrow" w="sm" len="sm"/>
+            </a:ln>
+            <a:effectLst/>
+          </p:spPr>
+        </p:cxnSp>
+      </p:grpSp>
     </p:spTree>
   </p:cSld>
   <p:clrMapOvr>
@@ -5464,791 +5513,6 @@
 </file>
 
 <file path=ppt/slides/slide5.xml><?xml version="1.0" encoding="utf-8"?>
-<p:sld xmlns:a="http://schemas.openxmlformats.org/drawingml/2006/main" xmlns:r="http://schemas.openxmlformats.org/officeDocument/2006/relationships" xmlns:p="http://schemas.openxmlformats.org/presentationml/2006/main">
-  <p:cSld>
-    <p:spTree>
-      <p:nvGrpSpPr>
-        <p:cNvPr id="1" name=""/>
-        <p:cNvGrpSpPr/>
-        <p:nvPr/>
-      </p:nvGrpSpPr>
-      <p:grpSpPr>
-        <a:xfrm>
-          <a:off x="0" y="0"/>
-          <a:ext cx="0" cy="0"/>
-          <a:chOff x="0" y="0"/>
-          <a:chExt cx="0" cy="0"/>
-        </a:xfrm>
-      </p:grpSpPr>
-      <p:sp>
-        <p:nvSpPr>
-          <p:cNvPr id="3" name="Content Placeholder 2"/>
-          <p:cNvSpPr>
-            <a:spLocks noGrp="1"/>
-          </p:cNvSpPr>
-          <p:nvPr>
-            <p:ph idx="1"/>
-          </p:nvPr>
-        </p:nvSpPr>
-        <p:spPr>
-          <a:xfrm>
-            <a:off x="228600" y="1219200"/>
-            <a:ext cx="8763000" cy="4419600"/>
-          </a:xfrm>
-        </p:spPr>
-        <p:txBody>
-          <a:bodyPr/>
-          <a:lstStyle/>
-          <a:p>
-            <a:pPr marL="0" indent="0">
-              <a:buNone/>
-            </a:pPr>
-            <a:r>
-              <a:rPr lang="en-US" sz="4400" dirty="0" smtClean="0"/>
-              <a:t>For </a:t>
-            </a:r>
-            <a:r>
-              <a:rPr lang="en-US" sz="4400" dirty="0" smtClean="0">
-                <a:solidFill>
-                  <a:srgbClr val="0000FF"/>
-                </a:solidFill>
-              </a:rPr>
-              <a:t>n</a:t>
-            </a:r>
-            <a:r>
-              <a:rPr lang="en-US" sz="4400" dirty="0" smtClean="0"/>
-              <a:t>-node graph, the </a:t>
-            </a:r>
-            <a:r>
-              <a:rPr lang="en-US" sz="4400" dirty="0" err="1">
-                <a:solidFill>
-                  <a:srgbClr val="0000FF"/>
-                </a:solidFill>
-              </a:rPr>
-              <a:t>n</a:t>
-            </a:r>
-            <a:r>
-              <a:rPr lang="en-US" sz="4400" b="1" dirty="0" err="1">
-                <a:solidFill>
-                  <a:srgbClr val="0000FF"/>
-                </a:solidFill>
-                <a:latin typeface="Euclid Symbol" charset="2"/>
-                <a:cs typeface="Euclid Symbol" charset="2"/>
-              </a:rPr>
-              <a:t>×</a:t>
-            </a:r>
-            <a:r>
-              <a:rPr lang="en-US" sz="4400" dirty="0" err="1" smtClean="0">
-                <a:solidFill>
-                  <a:srgbClr val="0000FF"/>
-                </a:solidFill>
-              </a:rPr>
-              <a:t>n</a:t>
-            </a:r>
-            <a:endParaRPr lang="en-US" sz="4400" dirty="0" smtClean="0"/>
-          </a:p>
-          <a:p>
-            <a:pPr marL="0" indent="0">
-              <a:buNone/>
-            </a:pPr>
-            <a:r>
-              <a:rPr lang="en-US" sz="4400" dirty="0" smtClean="0"/>
-              <a:t>edge matrix </a:t>
-            </a:r>
-            <a:r>
-              <a:rPr lang="en-US" sz="4400" dirty="0" smtClean="0">
-                <a:solidFill>
-                  <a:srgbClr val="0000FF"/>
-                </a:solidFill>
-              </a:rPr>
-              <a:t>M</a:t>
-            </a:r>
-            <a:r>
-              <a:rPr lang="en-US" sz="4400" dirty="0" smtClean="0"/>
-              <a:t> has</a:t>
-            </a:r>
-          </a:p>
-          <a:p>
-            <a:pPr marL="0" indent="0">
-              <a:buNone/>
-            </a:pPr>
-            <a:r>
-              <a:rPr lang="en-US" sz="4400" dirty="0" err="1" smtClean="0">
-                <a:solidFill>
-                  <a:srgbClr val="0000FF"/>
-                </a:solidFill>
-              </a:rPr>
-              <a:t>M</a:t>
-            </a:r>
-            <a:r>
-              <a:rPr lang="en-US" sz="4400" baseline="-25000" dirty="0" err="1" smtClean="0">
-                <a:solidFill>
-                  <a:srgbClr val="0000FF"/>
-                </a:solidFill>
-              </a:rPr>
-              <a:t>ij</a:t>
-            </a:r>
-            <a:r>
-              <a:rPr lang="en-US" sz="4400" dirty="0" smtClean="0"/>
-              <a:t> ::= probability of edge</a:t>
-            </a:r>
-          </a:p>
-          <a:p>
-            <a:pPr marL="0" indent="0">
-              <a:buNone/>
-            </a:pPr>
-            <a:r>
-              <a:rPr lang="en-US" sz="4400" dirty="0" smtClean="0"/>
-              <a:t>Find stationary </a:t>
-            </a:r>
-            <a:r>
-              <a:rPr lang="en-US" sz="4400" dirty="0" err="1" smtClean="0"/>
-              <a:t>dist</a:t>
-            </a:r>
-            <a:r>
-              <a:rPr lang="en-US" sz="4400" dirty="0" smtClean="0"/>
-              <a:t> vector    :</a:t>
-            </a:r>
-          </a:p>
-          <a:p>
-            <a:pPr marL="0" indent="0">
-              <a:buNone/>
-            </a:pPr>
-            <a:r>
-              <a:rPr lang="en-US" sz="6600" dirty="0" smtClean="0">
-                <a:solidFill>
-                  <a:srgbClr val="0000FF"/>
-                </a:solidFill>
-              </a:rPr>
-              <a:t>          M   </a:t>
-            </a:r>
-            <a:r>
-              <a:rPr lang="en-US" sz="6600" b="1" dirty="0" smtClean="0">
-                <a:solidFill>
-                  <a:srgbClr val="0000FF"/>
-                </a:solidFill>
-                <a:latin typeface="Euclid Symbol" charset="2"/>
-                <a:cs typeface="Euclid Symbol" charset="2"/>
-              </a:rPr>
-              <a:t>=</a:t>
-            </a:r>
-            <a:r>
-              <a:rPr lang="en-US" sz="6600" dirty="0" smtClean="0">
-                <a:solidFill>
-                  <a:srgbClr val="0000FF"/>
-                </a:solidFill>
-              </a:rPr>
-              <a:t> </a:t>
-            </a:r>
-            <a:endParaRPr lang="en-US" sz="5400" dirty="0">
-              <a:solidFill>
-                <a:srgbClr val="0000FF"/>
-              </a:solidFill>
-            </a:endParaRPr>
-          </a:p>
-        </p:txBody>
-      </p:sp>
-      <p:sp>
-        <p:nvSpPr>
-          <p:cNvPr id="2" name="Title 1"/>
-          <p:cNvSpPr>
-            <a:spLocks noGrp="1"/>
-          </p:cNvSpPr>
-          <p:nvPr>
-            <p:ph type="title"/>
-          </p:nvPr>
-        </p:nvSpPr>
-        <p:spPr>
-          <a:xfrm>
-            <a:off x="1443038" y="301625"/>
-            <a:ext cx="6710362" cy="1069975"/>
-          </a:xfrm>
-        </p:spPr>
-        <p:txBody>
-          <a:bodyPr/>
-          <a:lstStyle/>
-          <a:p>
-            <a:r>
-              <a:rPr lang="en-US" dirty="0" smtClean="0"/>
-              <a:t>Linear Algebra</a:t>
-            </a:r>
-            <a:endParaRPr lang="en-US" dirty="0"/>
-          </a:p>
-        </p:txBody>
-      </p:sp>
-      <p:sp>
-        <p:nvSpPr>
-          <p:cNvPr id="4" name="Date Placeholder 3"/>
-          <p:cNvSpPr>
-            <a:spLocks noGrp="1"/>
-          </p:cNvSpPr>
-          <p:nvPr>
-            <p:ph type="dt" sz="half" idx="2"/>
-          </p:nvPr>
-        </p:nvSpPr>
-        <p:spPr>
-          <a:xfrm>
-            <a:off x="3124200" y="6629400"/>
-            <a:ext cx="2863850" cy="228600"/>
-          </a:xfrm>
-        </p:spPr>
-        <p:txBody>
-          <a:bodyPr/>
-          <a:lstStyle/>
-          <a:p>
-            <a:pPr>
-              <a:defRPr/>
-            </a:pPr>
-            <a:r>
-              <a:rPr lang="en-US" dirty="0" smtClean="0"/>
-              <a:t>December 6, 2013</a:t>
-            </a:r>
-            <a:endParaRPr lang="en-US" dirty="0"/>
-          </a:p>
-        </p:txBody>
-      </p:sp>
-      <p:sp>
-        <p:nvSpPr>
-          <p:cNvPr id="5" name="Slide Number Placeholder 4"/>
-          <p:cNvSpPr>
-            <a:spLocks noGrp="1"/>
-          </p:cNvSpPr>
-          <p:nvPr>
-            <p:ph type="sldNum" sz="quarter" idx="12"/>
-          </p:nvPr>
-        </p:nvSpPr>
-        <p:spPr/>
-        <p:txBody>
-          <a:bodyPr/>
-          <a:lstStyle/>
-          <a:p>
-            <a:pPr>
-              <a:defRPr/>
-            </a:pPr>
-            <a:r>
-              <a:rPr lang="en-US" smtClean="0"/>
-              <a:t>random-walk.</a:t>
-            </a:r>
-            <a:fld id="{E877D3CB-F960-BD47-98A7-06971C504846}" type="slidenum">
-              <a:rPr lang="en-US" smtClean="0"/>
-              <a:pPr>
-                <a:defRPr/>
-              </a:pPr>
-              <a:t>5</a:t>
-            </a:fld>
-            <a:endParaRPr lang="en-US" smtClean="0"/>
-          </a:p>
-          <a:p>
-            <a:pPr>
-              <a:defRPr/>
-            </a:pPr>
-            <a:endParaRPr lang="en-US" dirty="0"/>
-          </a:p>
-        </p:txBody>
-      </p:sp>
-      <p:grpSp>
-        <p:nvGrpSpPr>
-          <p:cNvPr id="13" name="Group 12"/>
-          <p:cNvGrpSpPr/>
-          <p:nvPr/>
-        </p:nvGrpSpPr>
-        <p:grpSpPr>
-          <a:xfrm>
-            <a:off x="7086600" y="2895600"/>
-            <a:ext cx="1447800" cy="660976"/>
-            <a:chOff x="6705600" y="3530024"/>
-            <a:chExt cx="1447800" cy="660976"/>
-          </a:xfrm>
-        </p:grpSpPr>
-        <p:sp>
-          <p:nvSpPr>
-            <p:cNvPr id="6" name="Oval 5"/>
-            <p:cNvSpPr/>
-            <p:nvPr/>
-          </p:nvSpPr>
-          <p:spPr bwMode="auto">
-            <a:xfrm>
-              <a:off x="6705600" y="3657600"/>
-              <a:ext cx="533400" cy="533400"/>
-            </a:xfrm>
-            <a:prstGeom prst="ellipse">
-              <a:avLst/>
-            </a:prstGeom>
-            <a:solidFill>
-              <a:schemeClr val="accent1"/>
-            </a:solidFill>
-            <a:ln w="9525" cap="flat" cmpd="sng" algn="ctr">
-              <a:solidFill>
-                <a:schemeClr val="tx1"/>
-              </a:solidFill>
-              <a:prstDash val="solid"/>
-              <a:round/>
-              <a:headEnd type="none" w="med" len="med"/>
-              <a:tailEnd type="none" w="med" len="med"/>
-            </a:ln>
-            <a:effectLst/>
-          </p:spPr>
-          <p:txBody>
-            <a:bodyPr vert="horz" wrap="square" lIns="91440" tIns="45720" rIns="91440" bIns="45720" numCol="1" rtlCol="0" anchor="t" anchorCtr="0" compatLnSpc="1">
-              <a:prstTxWarp prst="textNoShape">
-                <a:avLst/>
-              </a:prstTxWarp>
-            </a:bodyPr>
-            <a:lstStyle/>
-            <a:p>
-              <a:pPr marL="0" marR="0" indent="0" algn="l" defTabSz="914400" rtl="0" eaLnBrk="0" fontAlgn="base" latinLnBrk="0" hangingPunct="0">
-                <a:lnSpc>
-                  <a:spcPct val="100000"/>
-                </a:lnSpc>
-                <a:spcBef>
-                  <a:spcPct val="0"/>
-                </a:spcBef>
-                <a:spcAft>
-                  <a:spcPct val="0"/>
-                </a:spcAft>
-                <a:buClrTx/>
-                <a:buSzTx/>
-                <a:buFontTx/>
-                <a:buNone/>
-                <a:tabLst/>
-              </a:pPr>
-              <a:endParaRPr kumimoji="0" lang="en-US" sz="2400" b="0" i="0" u="none" strike="noStrike" cap="none" normalizeH="0" baseline="0" smtClean="0">
-                <a:ln>
-                  <a:noFill/>
-                </a:ln>
-                <a:solidFill>
-                  <a:schemeClr val="tx1"/>
-                </a:solidFill>
-                <a:effectLst/>
-                <a:latin typeface="Comic Sans MS" pitchFamily="-64" charset="0"/>
-                <a:ea typeface="ＭＳ Ｐゴシック" pitchFamily="-64" charset="-128"/>
-              </a:endParaRPr>
-            </a:p>
-          </p:txBody>
-        </p:sp>
-        <p:sp>
-          <p:nvSpPr>
-            <p:cNvPr id="7" name="Oval 6"/>
-            <p:cNvSpPr/>
-            <p:nvPr/>
-          </p:nvSpPr>
-          <p:spPr bwMode="auto">
-            <a:xfrm>
-              <a:off x="7620000" y="3657600"/>
-              <a:ext cx="533400" cy="533400"/>
-            </a:xfrm>
-            <a:prstGeom prst="ellipse">
-              <a:avLst/>
-            </a:prstGeom>
-            <a:solidFill>
-              <a:schemeClr val="accent1"/>
-            </a:solidFill>
-            <a:ln w="9525" cap="flat" cmpd="sng" algn="ctr">
-              <a:solidFill>
-                <a:schemeClr val="tx1"/>
-              </a:solidFill>
-              <a:prstDash val="solid"/>
-              <a:round/>
-              <a:headEnd type="none" w="med" len="med"/>
-              <a:tailEnd type="none" w="med" len="med"/>
-            </a:ln>
-            <a:effectLst/>
-          </p:spPr>
-          <p:txBody>
-            <a:bodyPr vert="horz" wrap="square" lIns="91440" tIns="45720" rIns="91440" bIns="45720" numCol="1" rtlCol="0" anchor="t" anchorCtr="0" compatLnSpc="1">
-              <a:prstTxWarp prst="textNoShape">
-                <a:avLst/>
-              </a:prstTxWarp>
-            </a:bodyPr>
-            <a:lstStyle/>
-            <a:p>
-              <a:pPr marL="0" marR="0" indent="0" algn="l" defTabSz="914400" rtl="0" eaLnBrk="0" fontAlgn="base" latinLnBrk="0" hangingPunct="0">
-                <a:lnSpc>
-                  <a:spcPct val="100000"/>
-                </a:lnSpc>
-                <a:spcBef>
-                  <a:spcPct val="0"/>
-                </a:spcBef>
-                <a:spcAft>
-                  <a:spcPct val="0"/>
-                </a:spcAft>
-                <a:buClrTx/>
-                <a:buSzTx/>
-                <a:buFontTx/>
-                <a:buNone/>
-                <a:tabLst/>
-              </a:pPr>
-              <a:endParaRPr kumimoji="0" lang="en-US" sz="2400" b="0" i="0" u="none" strike="noStrike" cap="none" normalizeH="0" baseline="0" smtClean="0">
-                <a:ln>
-                  <a:noFill/>
-                </a:ln>
-                <a:solidFill>
-                  <a:schemeClr val="tx1"/>
-                </a:solidFill>
-                <a:effectLst/>
-                <a:latin typeface="Comic Sans MS" pitchFamily="-64" charset="0"/>
-                <a:ea typeface="ＭＳ Ｐゴシック" pitchFamily="-64" charset="-128"/>
-              </a:endParaRPr>
-            </a:p>
-          </p:txBody>
-        </p:sp>
-        <p:sp>
-          <p:nvSpPr>
-            <p:cNvPr id="8" name="TextBox 7"/>
-            <p:cNvSpPr txBox="1"/>
-            <p:nvPr/>
-          </p:nvSpPr>
-          <p:spPr>
-            <a:xfrm>
-              <a:off x="6781800" y="3581400"/>
-              <a:ext cx="299681" cy="584776"/>
-            </a:xfrm>
-            <a:prstGeom prst="rect">
-              <a:avLst/>
-            </a:prstGeom>
-            <a:noFill/>
-          </p:spPr>
-          <p:txBody>
-            <a:bodyPr wrap="none" rtlCol="0">
-              <a:spAutoFit/>
-            </a:bodyPr>
-            <a:lstStyle/>
-            <a:p>
-              <a:r>
-                <a:rPr lang="en-US" sz="3200" dirty="0" err="1" smtClean="0">
-                  <a:solidFill>
-                    <a:srgbClr val="0000FF"/>
-                  </a:solidFill>
-                </a:rPr>
-                <a:t>i</a:t>
-              </a:r>
-              <a:endParaRPr lang="en-US" sz="3200" dirty="0">
-                <a:solidFill>
-                  <a:srgbClr val="0000FF"/>
-                </a:solidFill>
-              </a:endParaRPr>
-            </a:p>
-          </p:txBody>
-        </p:sp>
-        <p:sp>
-          <p:nvSpPr>
-            <p:cNvPr id="9" name="TextBox 8"/>
-            <p:cNvSpPr txBox="1"/>
-            <p:nvPr/>
-          </p:nvSpPr>
-          <p:spPr>
-            <a:xfrm>
-              <a:off x="7696200" y="3530024"/>
-              <a:ext cx="350176" cy="584776"/>
-            </a:xfrm>
-            <a:prstGeom prst="rect">
-              <a:avLst/>
-            </a:prstGeom>
-            <a:noFill/>
-          </p:spPr>
-          <p:txBody>
-            <a:bodyPr wrap="none" rtlCol="0">
-              <a:spAutoFit/>
-            </a:bodyPr>
-            <a:lstStyle/>
-            <a:p>
-              <a:r>
-                <a:rPr lang="en-US" sz="3200" dirty="0" smtClean="0">
-                  <a:solidFill>
-                    <a:srgbClr val="0000FF"/>
-                  </a:solidFill>
-                </a:rPr>
-                <a:t>j</a:t>
-              </a:r>
-              <a:endParaRPr lang="en-US" sz="3200" dirty="0">
-                <a:solidFill>
-                  <a:srgbClr val="0000FF"/>
-                </a:solidFill>
-              </a:endParaRPr>
-            </a:p>
-          </p:txBody>
-        </p:sp>
-        <p:cxnSp>
-          <p:nvCxnSpPr>
-            <p:cNvPr id="11" name="Straight Arrow Connector 10"/>
-            <p:cNvCxnSpPr>
-              <a:stCxn id="6" idx="6"/>
-              <a:endCxn id="7" idx="2"/>
-            </p:cNvCxnSpPr>
-            <p:nvPr/>
-          </p:nvCxnSpPr>
-          <p:spPr bwMode="auto">
-            <a:xfrm>
-              <a:off x="7239000" y="3924300"/>
-              <a:ext cx="381000" cy="0"/>
-            </a:xfrm>
-            <a:prstGeom prst="straightConnector1">
-              <a:avLst/>
-            </a:prstGeom>
-            <a:solidFill>
-              <a:schemeClr val="accent1"/>
-            </a:solidFill>
-            <a:ln w="31750" cap="flat" cmpd="sng" algn="ctr">
-              <a:solidFill>
-                <a:schemeClr val="tx1"/>
-              </a:solidFill>
-              <a:prstDash val="solid"/>
-              <a:round/>
-              <a:headEnd type="none" w="med" len="med"/>
-              <a:tailEnd type="stealth" w="lg" len="lg"/>
-            </a:ln>
-            <a:effectLst/>
-          </p:spPr>
-        </p:cxnSp>
-      </p:grpSp>
-      <p:grpSp>
-        <p:nvGrpSpPr>
-          <p:cNvPr id="21" name="Group 20"/>
-          <p:cNvGrpSpPr/>
-          <p:nvPr/>
-        </p:nvGrpSpPr>
-        <p:grpSpPr>
-          <a:xfrm>
-            <a:off x="7389244" y="3657600"/>
-            <a:ext cx="459356" cy="769441"/>
-            <a:chOff x="7389244" y="3657600"/>
-            <a:chExt cx="459356" cy="769441"/>
-          </a:xfrm>
-        </p:grpSpPr>
-        <p:sp>
-          <p:nvSpPr>
-            <p:cNvPr id="19" name="TextBox 18"/>
-            <p:cNvSpPr txBox="1"/>
-            <p:nvPr/>
-          </p:nvSpPr>
-          <p:spPr>
-            <a:xfrm>
-              <a:off x="7389244" y="3657600"/>
-              <a:ext cx="459356" cy="769441"/>
-            </a:xfrm>
-            <a:prstGeom prst="rect">
-              <a:avLst/>
-            </a:prstGeom>
-            <a:noFill/>
-          </p:spPr>
-          <p:txBody>
-            <a:bodyPr wrap="none" rtlCol="0">
-              <a:spAutoFit/>
-            </a:bodyPr>
-            <a:lstStyle/>
-            <a:p>
-              <a:r>
-                <a:rPr lang="en-US" sz="4400" b="1" dirty="0">
-                  <a:solidFill>
-                    <a:srgbClr val="0000FF"/>
-                  </a:solidFill>
-                </a:rPr>
-                <a:t>s</a:t>
-              </a:r>
-              <a:endParaRPr lang="en-US" sz="4400" dirty="0"/>
-            </a:p>
-          </p:txBody>
-        </p:sp>
-        <p:cxnSp>
-          <p:nvCxnSpPr>
-            <p:cNvPr id="17" name="Straight Arrow Connector 16"/>
-            <p:cNvCxnSpPr/>
-            <p:nvPr/>
-          </p:nvCxnSpPr>
-          <p:spPr bwMode="auto">
-            <a:xfrm>
-              <a:off x="7467600" y="3886200"/>
-              <a:ext cx="381000" cy="0"/>
-            </a:xfrm>
-            <a:prstGeom prst="straightConnector1">
-              <a:avLst/>
-            </a:prstGeom>
-            <a:solidFill>
-              <a:schemeClr val="accent1"/>
-            </a:solidFill>
-            <a:ln w="38100" cap="flat" cmpd="sng" algn="ctr">
-              <a:solidFill>
-                <a:srgbClr val="0000FF"/>
-              </a:solidFill>
-              <a:prstDash val="solid"/>
-              <a:round/>
-              <a:headEnd type="none" w="med" len="med"/>
-              <a:tailEnd type="arrow" w="sm" len="sm"/>
-            </a:ln>
-            <a:effectLst/>
-          </p:spPr>
-        </p:cxnSp>
-      </p:grpSp>
-      <p:grpSp>
-        <p:nvGrpSpPr>
-          <p:cNvPr id="26" name="Group 25"/>
-          <p:cNvGrpSpPr/>
-          <p:nvPr/>
-        </p:nvGrpSpPr>
-        <p:grpSpPr>
-          <a:xfrm>
-            <a:off x="3593015" y="4639270"/>
-            <a:ext cx="521785" cy="923330"/>
-            <a:chOff x="1981200" y="4572000"/>
-            <a:chExt cx="521785" cy="923330"/>
-          </a:xfrm>
-        </p:grpSpPr>
-        <p:sp>
-          <p:nvSpPr>
-            <p:cNvPr id="23" name="TextBox 22"/>
-            <p:cNvSpPr txBox="1"/>
-            <p:nvPr/>
-          </p:nvSpPr>
-          <p:spPr>
-            <a:xfrm>
-              <a:off x="1981200" y="4572000"/>
-              <a:ext cx="521785" cy="923330"/>
-            </a:xfrm>
-            <a:prstGeom prst="rect">
-              <a:avLst/>
-            </a:prstGeom>
-            <a:noFill/>
-          </p:spPr>
-          <p:txBody>
-            <a:bodyPr wrap="none" rtlCol="0">
-              <a:spAutoFit/>
-            </a:bodyPr>
-            <a:lstStyle/>
-            <a:p>
-              <a:r>
-                <a:rPr lang="en-US" sz="5400" b="1" dirty="0">
-                  <a:solidFill>
-                    <a:srgbClr val="0000FF"/>
-                  </a:solidFill>
-                </a:rPr>
-                <a:t>s</a:t>
-              </a:r>
-              <a:endParaRPr lang="en-US" sz="5400" dirty="0"/>
-            </a:p>
-          </p:txBody>
-        </p:sp>
-        <p:cxnSp>
-          <p:nvCxnSpPr>
-            <p:cNvPr id="24" name="Straight Arrow Connector 23"/>
-            <p:cNvCxnSpPr/>
-            <p:nvPr/>
-          </p:nvCxnSpPr>
-          <p:spPr bwMode="auto">
-            <a:xfrm>
-              <a:off x="2057400" y="4800600"/>
-              <a:ext cx="381000" cy="0"/>
-            </a:xfrm>
-            <a:prstGeom prst="straightConnector1">
-              <a:avLst/>
-            </a:prstGeom>
-            <a:solidFill>
-              <a:schemeClr val="accent1"/>
-            </a:solidFill>
-            <a:ln w="38100" cap="flat" cmpd="sng" algn="ctr">
-              <a:solidFill>
-                <a:srgbClr val="0000FF"/>
-              </a:solidFill>
-              <a:prstDash val="solid"/>
-              <a:round/>
-              <a:headEnd type="none" w="med" len="med"/>
-              <a:tailEnd type="arrow" w="sm" len="sm"/>
-            </a:ln>
-            <a:effectLst/>
-          </p:spPr>
-        </p:cxnSp>
-      </p:grpSp>
-      <p:grpSp>
-        <p:nvGrpSpPr>
-          <p:cNvPr id="28" name="Group 27"/>
-          <p:cNvGrpSpPr/>
-          <p:nvPr/>
-        </p:nvGrpSpPr>
-        <p:grpSpPr>
-          <a:xfrm>
-            <a:off x="5117015" y="4630340"/>
-            <a:ext cx="521785" cy="923330"/>
-            <a:chOff x="1981200" y="4572000"/>
-            <a:chExt cx="521785" cy="923330"/>
-          </a:xfrm>
-        </p:grpSpPr>
-        <p:sp>
-          <p:nvSpPr>
-            <p:cNvPr id="29" name="TextBox 28"/>
-            <p:cNvSpPr txBox="1"/>
-            <p:nvPr/>
-          </p:nvSpPr>
-          <p:spPr>
-            <a:xfrm>
-              <a:off x="1981200" y="4572000"/>
-              <a:ext cx="521785" cy="923330"/>
-            </a:xfrm>
-            <a:prstGeom prst="rect">
-              <a:avLst/>
-            </a:prstGeom>
-            <a:noFill/>
-          </p:spPr>
-          <p:txBody>
-            <a:bodyPr wrap="none" rtlCol="0">
-              <a:spAutoFit/>
-            </a:bodyPr>
-            <a:lstStyle/>
-            <a:p>
-              <a:r>
-                <a:rPr lang="en-US" sz="5400" b="1" dirty="0">
-                  <a:solidFill>
-                    <a:srgbClr val="0000FF"/>
-                  </a:solidFill>
-                </a:rPr>
-                <a:t>s</a:t>
-              </a:r>
-              <a:endParaRPr lang="en-US" sz="5400" dirty="0"/>
-            </a:p>
-          </p:txBody>
-        </p:sp>
-        <p:cxnSp>
-          <p:nvCxnSpPr>
-            <p:cNvPr id="30" name="Straight Arrow Connector 29"/>
-            <p:cNvCxnSpPr/>
-            <p:nvPr/>
-          </p:nvCxnSpPr>
-          <p:spPr bwMode="auto">
-            <a:xfrm>
-              <a:off x="2057400" y="4800600"/>
-              <a:ext cx="381000" cy="0"/>
-            </a:xfrm>
-            <a:prstGeom prst="straightConnector1">
-              <a:avLst/>
-            </a:prstGeom>
-            <a:solidFill>
-              <a:schemeClr val="accent1"/>
-            </a:solidFill>
-            <a:ln w="38100" cap="flat" cmpd="sng" algn="ctr">
-              <a:solidFill>
-                <a:srgbClr val="0000FF"/>
-              </a:solidFill>
-              <a:prstDash val="solid"/>
-              <a:round/>
-              <a:headEnd type="none" w="med" len="med"/>
-              <a:tailEnd type="arrow" w="sm" len="sm"/>
-            </a:ln>
-            <a:effectLst/>
-          </p:spPr>
-        </p:cxnSp>
-      </p:grpSp>
-    </p:spTree>
-    <p:extLst>
-      <p:ext uri="{BB962C8B-B14F-4D97-AF65-F5344CB8AC3E}">
-        <p14:creationId xmlns:p14="http://schemas.microsoft.com/office/powerpoint/2010/main" val="171586865"/>
-      </p:ext>
-    </p:extLst>
-  </p:cSld>
-  <p:clrMapOvr>
-    <a:masterClrMapping/>
-  </p:clrMapOvr>
-</p:sld>
-</file>
-
-<file path=ppt/slides/slide6.xml><?xml version="1.0" encoding="utf-8"?>
 <p:sld xmlns:a="http://schemas.openxmlformats.org/drawingml/2006/main" xmlns:r="http://schemas.openxmlformats.org/officeDocument/2006/relationships" xmlns:p="http://schemas.openxmlformats.org/presentationml/2006/main" show="0">
   <p:cSld>
     <p:spTree>
@@ -6330,7 +5594,7 @@
               <a:pPr>
                 <a:defRPr/>
               </a:pPr>
-              <a:t>6</a:t>
+              <a:t>5</a:t>
             </a:fld>
             <a:endParaRPr lang="en-US" smtClean="0"/>
           </a:p>

</xml_diff>

<commit_message>
edit random-walks, stationary-distribution, page-rank.pptx
</commit_message>
<xml_diff>
--- a/fall13/slidesF13/page-rank.pptx
+++ b/fall13/slidesF13/page-rank.pptx
@@ -5,10 +5,10 @@
     <p:sldMasterId id="2147483648" r:id="rId1"/>
   </p:sldMasterIdLst>
   <p:notesMasterIdLst>
-    <p:notesMasterId r:id="rId10"/>
+    <p:notesMasterId r:id="rId12"/>
   </p:notesMasterIdLst>
   <p:handoutMasterIdLst>
-    <p:handoutMasterId r:id="rId11"/>
+    <p:handoutMasterId r:id="rId13"/>
   </p:handoutMasterIdLst>
   <p:sldIdLst>
     <p:sldId id="333" r:id="rId2"/>
@@ -19,6 +19,8 @@
     <p:sldId id="338" r:id="rId7"/>
     <p:sldId id="339" r:id="rId8"/>
     <p:sldId id="337" r:id="rId9"/>
+    <p:sldId id="341" r:id="rId10"/>
+    <p:sldId id="342" r:id="rId11"/>
   </p:sldIdLst>
   <p:sldSz cx="9144000" cy="6858000" type="screen4x3"/>
   <p:notesSz cx="9601200" cy="7315200"/>
@@ -1614,7 +1616,7 @@
             </a:pPr>
             <a:r>
               <a:rPr lang="en-US" dirty="0" smtClean="0"/>
-              <a:t>random-walk.</a:t>
+              <a:t>page-rank.</a:t>
             </a:r>
             <a:fld id="{52DC2636-7C60-9B40-89EE-9F4C3E34F60C}" type="slidenum">
               <a:rPr lang="en-US" smtClean="0"/>
@@ -1691,6 +1693,13 @@
   <p:clrMapOvr>
     <a:masterClrMapping/>
   </p:clrMapOvr>
+  <p:timing>
+    <p:tnLst>
+      <p:par>
+        <p:cTn xmlns:p14="http://schemas.microsoft.com/office/powerpoint/2010/main" id="1" dur="indefinite" restart="never" nodeType="tmRoot"/>
+      </p:par>
+    </p:tnLst>
+  </p:timing>
 </p:sldLayout>
 </file>
 
@@ -1810,7 +1819,7 @@
             </a:pPr>
             <a:r>
               <a:rPr lang="en-US" dirty="0" smtClean="0"/>
-              <a:t>random-walk.</a:t>
+              <a:t>page-rank.</a:t>
             </a:r>
             <a:fld id="{E877D3CB-F960-BD47-98A7-06971C504846}" type="slidenum">
               <a:rPr lang="en-US" smtClean="0"/>
@@ -1887,6 +1896,13 @@
   <p:clrMapOvr>
     <a:masterClrMapping/>
   </p:clrMapOvr>
+  <p:timing>
+    <p:tnLst>
+      <p:par>
+        <p:cTn xmlns:p14="http://schemas.microsoft.com/office/powerpoint/2010/main" id="1" dur="indefinite" restart="never" nodeType="tmRoot"/>
+      </p:par>
+    </p:tnLst>
+  </p:timing>
 </p:sldLayout>
 </file>
 
@@ -2028,7 +2044,7 @@
             </a:pPr>
             <a:r>
               <a:rPr lang="en-US" dirty="0" smtClean="0"/>
-              <a:t>random-walk.</a:t>
+              <a:t>page-rank.</a:t>
             </a:r>
             <a:fld id="{7F643A20-AA31-5341-AD6A-0A2807DB3AE7}" type="slidenum">
               <a:rPr lang="en-US" smtClean="0"/>
@@ -2105,6 +2121,13 @@
   <p:clrMapOvr>
     <a:masterClrMapping/>
   </p:clrMapOvr>
+  <p:timing>
+    <p:tnLst>
+      <p:par>
+        <p:cTn xmlns:p14="http://schemas.microsoft.com/office/powerpoint/2010/main" id="1" dur="indefinite" restart="never" nodeType="tmRoot"/>
+      </p:par>
+    </p:tnLst>
+  </p:timing>
 </p:sldLayout>
 </file>
 
@@ -2172,7 +2195,7 @@
             </a:pPr>
             <a:r>
               <a:rPr lang="en-US" dirty="0" smtClean="0"/>
-              <a:t>random-walk.</a:t>
+              <a:t>page-rank.</a:t>
             </a:r>
             <a:fld id="{33406DE3-95F7-424A-AC10-91858B7908A3}" type="slidenum">
               <a:rPr lang="en-US" smtClean="0"/>
@@ -2249,6 +2272,13 @@
   <p:clrMapOvr>
     <a:masterClrMapping/>
   </p:clrMapOvr>
+  <p:timing>
+    <p:tnLst>
+      <p:par>
+        <p:cTn xmlns:p14="http://schemas.microsoft.com/office/powerpoint/2010/main" id="1" dur="indefinite" restart="never" nodeType="tmRoot"/>
+      </p:par>
+    </p:tnLst>
+  </p:timing>
 </p:sldLayout>
 </file>
 
@@ -2293,7 +2323,7 @@
             </a:pPr>
             <a:r>
               <a:rPr lang="en-US" dirty="0" smtClean="0"/>
-              <a:t>random-walk.</a:t>
+              <a:t>page-rank.</a:t>
             </a:r>
             <a:fld id="{C316881D-9589-DF4F-A336-A08976BD8D3F}" type="slidenum">
               <a:rPr lang="en-US" smtClean="0"/>
@@ -2370,6 +2400,13 @@
   <p:clrMapOvr>
     <a:masterClrMapping/>
   </p:clrMapOvr>
+  <p:timing>
+    <p:tnLst>
+      <p:par>
+        <p:cTn xmlns:p14="http://schemas.microsoft.com/office/powerpoint/2010/main" id="1" dur="indefinite" restart="never" nodeType="tmRoot"/>
+      </p:par>
+    </p:tnLst>
+  </p:timing>
 </p:sldLayout>
 </file>
 
@@ -2573,7 +2610,7 @@
             </a:pPr>
             <a:r>
               <a:rPr lang="en-US" dirty="0" smtClean="0"/>
-              <a:t>random-walk.</a:t>
+              <a:t>page-rank.</a:t>
             </a:r>
             <a:fld id="{A8E63D04-532A-9B48-95DF-D3C7BF4C2159}" type="slidenum">
               <a:rPr lang="en-US" smtClean="0"/>
@@ -2650,6 +2687,13 @@
   <p:clrMapOvr>
     <a:masterClrMapping/>
   </p:clrMapOvr>
+  <p:timing>
+    <p:tnLst>
+      <p:par>
+        <p:cTn xmlns:p14="http://schemas.microsoft.com/office/powerpoint/2010/main" id="1" dur="indefinite" restart="never" nodeType="tmRoot"/>
+      </p:par>
+    </p:tnLst>
+  </p:timing>
 </p:sldLayout>
 </file>
 
@@ -3435,7 +3479,7 @@
           <a:p>
             <a:r>
               <a:rPr lang="en-US" dirty="0" smtClean="0"/>
-              <a:t>random-walk.</a:t>
+              <a:t>page-rank.</a:t>
             </a:r>
             <a:fld id="{2D031A48-BBCF-B248-9771-B601B0D38C0B}" type="slidenum">
               <a:rPr lang="en-US" smtClean="0"/>
@@ -3627,7 +3671,11 @@
             </a:pPr>
             <a:r>
               <a:rPr lang="en-US" dirty="0" smtClean="0"/>
-              <a:t>Albert R Meyer,               December 6, 2013</a:t>
+              <a:t>Albert R Meyer,               December </a:t>
+            </a:r>
+            <a:r>
+              <a:rPr lang="en-US" dirty="0" smtClean="0"/>
+              <a:t>11, 2013</a:t>
             </a:r>
             <a:endParaRPr lang="en-US" dirty="0"/>
           </a:p>
@@ -3735,9 +3783,14 @@
   <p:clrMapOvr>
     <a:masterClrMapping/>
   </p:clrMapOvr>
-  <p:transition xmlns:p14="http://schemas.microsoft.com/office/powerpoint/2010/main" advClick="0">
-    <p:fade/>
-  </p:transition>
+  <mc:AlternateContent xmlns:mc="http://schemas.openxmlformats.org/markup-compatibility/2006" xmlns:p14="http://schemas.microsoft.com/office/powerpoint/2010/main">
+    <mc:Choice Requires="p14">
+      <p:transition p14:dur="0" advClick="0"/>
+    </mc:Choice>
+    <mc:Fallback xmlns="">
+      <p:transition xmlns:p14="http://schemas.microsoft.com/office/powerpoint/2010/main" advClick="0"/>
+    </mc:Fallback>
+  </mc:AlternateContent>
   <p:timing>
     <p:tnLst>
       <p:par>
@@ -3832,6 +3885,336 @@
 </p:sld>
 </file>
 
+<file path=ppt/slides/slide10.xml><?xml version="1.0" encoding="utf-8"?>
+<p:sld xmlns:a="http://schemas.openxmlformats.org/drawingml/2006/main" xmlns:r="http://schemas.openxmlformats.org/officeDocument/2006/relationships" xmlns:p="http://schemas.openxmlformats.org/presentationml/2006/main">
+  <p:cSld>
+    <p:spTree>
+      <p:nvGrpSpPr>
+        <p:cNvPr id="1" name=""/>
+        <p:cNvGrpSpPr/>
+        <p:nvPr/>
+      </p:nvGrpSpPr>
+      <p:grpSpPr>
+        <a:xfrm>
+          <a:off x="0" y="0"/>
+          <a:ext cx="0" cy="0"/>
+          <a:chOff x="0" y="0"/>
+          <a:chExt cx="0" cy="0"/>
+        </a:xfrm>
+      </p:grpSpPr>
+      <p:sp>
+        <p:nvSpPr>
+          <p:cNvPr id="2" name="Title 1"/>
+          <p:cNvSpPr>
+            <a:spLocks noGrp="1"/>
+          </p:cNvSpPr>
+          <p:nvPr>
+            <p:ph type="title"/>
+          </p:nvPr>
+        </p:nvSpPr>
+        <p:spPr>
+          <a:xfrm>
+            <a:off x="1443038" y="301625"/>
+            <a:ext cx="6329362" cy="917575"/>
+          </a:xfrm>
+        </p:spPr>
+        <p:txBody>
+          <a:bodyPr/>
+          <a:lstStyle/>
+          <a:p>
+            <a:r>
+              <a:rPr lang="en-US" dirty="0" smtClean="0"/>
+              <a:t>Actual Google Rank</a:t>
+            </a:r>
+            <a:endParaRPr lang="en-US" dirty="0"/>
+          </a:p>
+        </p:txBody>
+      </p:sp>
+      <p:sp>
+        <p:nvSpPr>
+          <p:cNvPr id="3" name="Content Placeholder 2"/>
+          <p:cNvSpPr>
+            <a:spLocks noGrp="1"/>
+          </p:cNvSpPr>
+          <p:nvPr>
+            <p:ph idx="1"/>
+          </p:nvPr>
+        </p:nvSpPr>
+        <p:spPr>
+          <a:xfrm>
+            <a:off x="228600" y="1371600"/>
+            <a:ext cx="8763000" cy="4191000"/>
+          </a:xfrm>
+        </p:spPr>
+        <p:txBody>
+          <a:bodyPr/>
+          <a:lstStyle/>
+          <a:p>
+            <a:pPr marL="0" indent="0">
+              <a:buNone/>
+            </a:pPr>
+            <a:r>
+              <a:rPr lang="en-US" sz="4000" dirty="0" smtClean="0"/>
+              <a:t>Google rank rules are a closely held trade secret using text, location, payment, and other criteria that have evolved for 15 years.</a:t>
+            </a:r>
+          </a:p>
+          <a:p>
+            <a:pPr marL="0" indent="0">
+              <a:buNone/>
+            </a:pPr>
+            <a:r>
+              <a:rPr lang="en-US" sz="4000" dirty="0" smtClean="0"/>
+              <a:t>But </a:t>
+            </a:r>
+            <a:r>
+              <a:rPr lang="en-US" sz="4000" dirty="0" smtClean="0">
+                <a:solidFill>
+                  <a:srgbClr val="0000FF"/>
+                </a:solidFill>
+              </a:rPr>
+              <a:t>PageRank </a:t>
+            </a:r>
+            <a:r>
+              <a:rPr lang="en-US" sz="4000" dirty="0" smtClean="0"/>
+              <a:t>continues to play a key role.</a:t>
+            </a:r>
+            <a:endParaRPr lang="en-US" sz="4000" dirty="0"/>
+          </a:p>
+        </p:txBody>
+      </p:sp>
+      <p:sp>
+        <p:nvSpPr>
+          <p:cNvPr id="4" name="Slide Number Placeholder 3"/>
+          <p:cNvSpPr>
+            <a:spLocks noGrp="1"/>
+          </p:cNvSpPr>
+          <p:nvPr>
+            <p:ph type="sldNum" sz="quarter" idx="12"/>
+          </p:nvPr>
+        </p:nvSpPr>
+        <p:spPr/>
+        <p:txBody>
+          <a:bodyPr/>
+          <a:lstStyle/>
+          <a:p>
+            <a:pPr>
+              <a:defRPr/>
+            </a:pPr>
+            <a:r>
+              <a:rPr lang="en-US" dirty="0" smtClean="0"/>
+              <a:t>page-rank.</a:t>
+            </a:r>
+            <a:fld id="{E877D3CB-F960-BD47-98A7-06971C504846}" type="slidenum">
+              <a:rPr lang="en-US" smtClean="0"/>
+              <a:pPr>
+                <a:defRPr/>
+              </a:pPr>
+              <a:t>10</a:t>
+            </a:fld>
+            <a:endParaRPr lang="en-US" dirty="0" smtClean="0"/>
+          </a:p>
+          <a:p>
+            <a:pPr>
+              <a:defRPr/>
+            </a:pPr>
+            <a:endParaRPr lang="en-US" dirty="0"/>
+          </a:p>
+        </p:txBody>
+      </p:sp>
+      <p:sp>
+        <p:nvSpPr>
+          <p:cNvPr id="5" name="Date Placeholder 4"/>
+          <p:cNvSpPr>
+            <a:spLocks noGrp="1"/>
+          </p:cNvSpPr>
+          <p:nvPr>
+            <p:ph type="dt" sz="half" idx="2"/>
+          </p:nvPr>
+        </p:nvSpPr>
+        <p:spPr/>
+        <p:txBody>
+          <a:bodyPr/>
+          <a:lstStyle/>
+          <a:p>
+            <a:pPr>
+              <a:defRPr/>
+            </a:pPr>
+            <a:r>
+              <a:rPr lang="en-US" smtClean="0"/>
+              <a:t>Albert R Meyer,           December 11, 2013</a:t>
+            </a:r>
+            <a:endParaRPr lang="en-US" dirty="0"/>
+          </a:p>
+        </p:txBody>
+      </p:sp>
+    </p:spTree>
+    <p:extLst>
+      <p:ext uri="{BB962C8B-B14F-4D97-AF65-F5344CB8AC3E}">
+        <p14:creationId xmlns:p14="http://schemas.microsoft.com/office/powerpoint/2010/main" val="2371703612"/>
+      </p:ext>
+    </p:extLst>
+  </p:cSld>
+  <p:clrMapOvr>
+    <a:masterClrMapping/>
+  </p:clrMapOvr>
+  <p:transition xmlns:p14="http://schemas.microsoft.com/office/powerpoint/2010/main" spd="slow">
+    <p:fade thruBlk="1"/>
+  </p:transition>
+  <p:timing>
+    <p:tnLst>
+      <p:par>
+        <p:cTn xmlns:p14="http://schemas.microsoft.com/office/powerpoint/2010/main" id="1" dur="indefinite" restart="never" nodeType="tmRoot">
+          <p:childTnLst>
+            <p:seq concurrent="1" nextAc="seek">
+              <p:cTn id="2" dur="indefinite" nodeType="mainSeq">
+                <p:childTnLst>
+                  <p:par>
+                    <p:cTn id="3" fill="hold">
+                      <p:stCondLst>
+                        <p:cond delay="indefinite"/>
+                      </p:stCondLst>
+                      <p:childTnLst>
+                        <p:par>
+                          <p:cTn id="4" fill="hold">
+                            <p:stCondLst>
+                              <p:cond delay="0"/>
+                            </p:stCondLst>
+                            <p:childTnLst>
+                              <p:par>
+                                <p:cTn id="5" presetID="10" presetClass="entr" presetSubtype="0" fill="hold" nodeType="clickEffect">
+                                  <p:stCondLst>
+                                    <p:cond delay="0"/>
+                                  </p:stCondLst>
+                                  <p:childTnLst>
+                                    <p:set>
+                                      <p:cBhvr>
+                                        <p:cTn id="6" dur="1" fill="hold">
+                                          <p:stCondLst>
+                                            <p:cond delay="0"/>
+                                          </p:stCondLst>
+                                        </p:cTn>
+                                        <p:tgtEl>
+                                          <p:spTgt spid="3">
+                                            <p:txEl>
+                                              <p:pRg st="0" end="0"/>
+                                            </p:txEl>
+                                          </p:spTgt>
+                                        </p:tgtEl>
+                                        <p:attrNameLst>
+                                          <p:attrName>style.visibility</p:attrName>
+                                        </p:attrNameLst>
+                                      </p:cBhvr>
+                                      <p:to>
+                                        <p:strVal val="visible"/>
+                                      </p:to>
+                                    </p:set>
+                                    <p:animEffect transition="in" filter="fade">
+                                      <p:cBhvr>
+                                        <p:cTn id="7" dur="500"/>
+                                        <p:tgtEl>
+                                          <p:spTgt spid="3">
+                                            <p:txEl>
+                                              <p:pRg st="0" end="0"/>
+                                            </p:txEl>
+                                          </p:spTgt>
+                                        </p:tgtEl>
+                                      </p:cBhvr>
+                                    </p:animEffect>
+                                  </p:childTnLst>
+                                </p:cTn>
+                              </p:par>
+                            </p:childTnLst>
+                          </p:cTn>
+                        </p:par>
+                      </p:childTnLst>
+                    </p:cTn>
+                  </p:par>
+                  <p:par>
+                    <p:cTn id="8" fill="hold">
+                      <p:stCondLst>
+                        <p:cond delay="indefinite"/>
+                      </p:stCondLst>
+                      <p:childTnLst>
+                        <p:par>
+                          <p:cTn id="9" fill="hold">
+                            <p:stCondLst>
+                              <p:cond delay="0"/>
+                            </p:stCondLst>
+                            <p:childTnLst>
+                              <p:par>
+                                <p:cTn id="10" presetID="10" presetClass="entr" presetSubtype="0" fill="hold" nodeType="clickEffect">
+                                  <p:stCondLst>
+                                    <p:cond delay="0"/>
+                                  </p:stCondLst>
+                                  <p:childTnLst>
+                                    <p:set>
+                                      <p:cBhvr>
+                                        <p:cTn id="11" dur="1" fill="hold">
+                                          <p:stCondLst>
+                                            <p:cond delay="0"/>
+                                          </p:stCondLst>
+                                        </p:cTn>
+                                        <p:tgtEl>
+                                          <p:spTgt spid="3">
+                                            <p:txEl>
+                                              <p:pRg st="1" end="1"/>
+                                            </p:txEl>
+                                          </p:spTgt>
+                                        </p:tgtEl>
+                                        <p:attrNameLst>
+                                          <p:attrName>style.visibility</p:attrName>
+                                        </p:attrNameLst>
+                                      </p:cBhvr>
+                                      <p:to>
+                                        <p:strVal val="visible"/>
+                                      </p:to>
+                                    </p:set>
+                                    <p:animEffect transition="in" filter="fade">
+                                      <p:cBhvr>
+                                        <p:cTn id="12" dur="500"/>
+                                        <p:tgtEl>
+                                          <p:spTgt spid="3">
+                                            <p:txEl>
+                                              <p:pRg st="1" end="1"/>
+                                            </p:txEl>
+                                          </p:spTgt>
+                                        </p:tgtEl>
+                                      </p:cBhvr>
+                                    </p:animEffect>
+                                  </p:childTnLst>
+                                </p:cTn>
+                              </p:par>
+                            </p:childTnLst>
+                          </p:cTn>
+                        </p:par>
+                      </p:childTnLst>
+                    </p:cTn>
+                  </p:par>
+                </p:childTnLst>
+              </p:cTn>
+              <p:prevCondLst>
+                <p:cond evt="onPrev" delay="0">
+                  <p:tgtEl>
+                    <p:sldTgt/>
+                  </p:tgtEl>
+                </p:cond>
+              </p:prevCondLst>
+              <p:nextCondLst>
+                <p:cond evt="onNext" delay="0">
+                  <p:tgtEl>
+                    <p:sldTgt/>
+                  </p:tgtEl>
+                </p:cond>
+              </p:nextCondLst>
+            </p:seq>
+          </p:childTnLst>
+        </p:cTn>
+      </p:par>
+    </p:tnLst>
+  </p:timing>
+</p:sld>
+</file>
+
 <file path=ppt/slides/slide2.xml><?xml version="1.0" encoding="utf-8"?>
 <p:sld xmlns:a="http://schemas.openxmlformats.org/drawingml/2006/main" xmlns:r="http://schemas.openxmlformats.org/officeDocument/2006/relationships" xmlns:p="http://schemas.openxmlformats.org/presentationml/2006/main">
   <p:cSld>
@@ -3868,7 +4251,7 @@
           <a:p>
             <a:r>
               <a:rPr lang="en-US" dirty="0" smtClean="0"/>
-              <a:t>random-walk.</a:t>
+              <a:t>page-rank.</a:t>
             </a:r>
             <a:fld id="{D73E32CF-FE78-5945-942C-324A7986BBD0}" type="slidenum">
               <a:rPr lang="en-US" smtClean="0"/>
@@ -3909,7 +4292,7 @@
             </a:r>
             <a:r>
               <a:rPr lang="en-US" dirty="0" smtClean="0"/>
-              <a:t>PageRank</a:t>
+              <a:t>Rankings</a:t>
             </a:r>
             <a:endParaRPr lang="en-US" dirty="0"/>
           </a:p>
@@ -4058,7 +4441,11 @@
             </a:pPr>
             <a:r>
               <a:rPr lang="en-US" dirty="0" smtClean="0"/>
-              <a:t>Albert R Meyer,               December 6, 2013</a:t>
+              <a:t>Albert R Meyer,               December </a:t>
+            </a:r>
+            <a:r>
+              <a:rPr lang="en-US" dirty="0" smtClean="0"/>
+              <a:t>11, 2013</a:t>
             </a:r>
             <a:endParaRPr lang="en-US" dirty="0"/>
           </a:p>
@@ -4393,7 +4780,7 @@
           <a:p>
             <a:r>
               <a:rPr lang="en-US" dirty="0" smtClean="0"/>
-              <a:t>random-walk.</a:t>
+              <a:t>page-rank.</a:t>
             </a:r>
             <a:fld id="{42298CDA-044A-0949-8A0D-DDA7F6833251}" type="slidenum">
               <a:rPr lang="en-US" smtClean="0"/>
@@ -4420,7 +4807,7 @@
         <p:spPr>
           <a:xfrm>
             <a:off x="381000" y="1600200"/>
-            <a:ext cx="8305800" cy="3657600"/>
+            <a:ext cx="8686800" cy="4648200"/>
           </a:xfrm>
         </p:spPr>
         <p:txBody>
@@ -4478,12 +4865,128 @@
               <a:t>edge </a:t>
             </a:r>
             <a:r>
+              <a:rPr lang="en-US" sz="4400" dirty="0" smtClean="0">
+                <a:solidFill>
+                  <a:srgbClr val="0000FF"/>
+                </a:solidFill>
+              </a:rPr>
+              <a:t>(V,W)</a:t>
+            </a:r>
+            <a:r>
+              <a:rPr lang="en-US" sz="4400" dirty="0" smtClean="0"/>
+              <a:t> </a:t>
+            </a:r>
+            <a:r>
+              <a:rPr lang="en-US" sz="4400" dirty="0"/>
+              <a:t>exists if link from page </a:t>
+            </a:r>
+            <a:r>
+              <a:rPr lang="en-US" sz="4400" dirty="0" smtClean="0">
+                <a:solidFill>
+                  <a:srgbClr val="0000FF"/>
+                </a:solidFill>
+              </a:rPr>
+              <a:t>V</a:t>
+            </a:r>
+            <a:r>
+              <a:rPr lang="en-US" sz="4400" dirty="0" smtClean="0"/>
+              <a:t> </a:t>
+            </a:r>
+            <a:r>
+              <a:rPr lang="en-US" sz="4400" dirty="0"/>
+              <a:t>to page </a:t>
+            </a:r>
+            <a:r>
+              <a:rPr lang="en-US" sz="4400" dirty="0" smtClean="0">
+                <a:solidFill>
+                  <a:srgbClr val="0000FF"/>
+                </a:solidFill>
+              </a:rPr>
+              <a:t>W</a:t>
+            </a:r>
+          </a:p>
+          <a:p>
+            <a:pPr eaLnBrk="1" hangingPunct="1">
+              <a:lnSpc>
+                <a:spcPct val="90000"/>
+              </a:lnSpc>
+            </a:pPr>
+            <a:r>
+              <a:rPr lang="en-US" sz="4400" dirty="0" smtClean="0"/>
+              <a:t>edges </a:t>
+            </a:r>
+            <a:r>
+              <a:rPr lang="en-US" sz="4400" dirty="0"/>
+              <a:t>out of </a:t>
+            </a:r>
+            <a:r>
+              <a:rPr lang="en-US" sz="4400" dirty="0" smtClean="0">
+                <a:solidFill>
+                  <a:srgbClr val="0000FF"/>
+                </a:solidFill>
+              </a:rPr>
+              <a:t>V</a:t>
+            </a:r>
+            <a:r>
+              <a:rPr lang="en-US" sz="4400" dirty="0" smtClean="0"/>
+              <a:t> </a:t>
+            </a:r>
+            <a:r>
+              <a:rPr lang="en-US" sz="4400" dirty="0"/>
+              <a:t>equally </a:t>
+            </a:r>
+            <a:r>
+              <a:rPr lang="en-US" sz="4400" dirty="0" smtClean="0"/>
+              <a:t>likely</a:t>
+            </a:r>
+            <a:endParaRPr lang="en-US" sz="4400" dirty="0">
+              <a:solidFill>
+                <a:srgbClr val="0000FF"/>
+              </a:solidFill>
+            </a:endParaRPr>
+          </a:p>
+          <a:p>
+            <a:pPr marL="0" indent="0" algn="ctr" eaLnBrk="1" hangingPunct="1">
+              <a:lnSpc>
+                <a:spcPct val="90000"/>
+              </a:lnSpc>
+              <a:buNone/>
+            </a:pPr>
+            <a:r>
+              <a:rPr lang="en-US" sz="4400" dirty="0" err="1" smtClean="0"/>
+              <a:t>Pr</a:t>
+            </a:r>
+            <a:r>
+              <a:rPr lang="en-US" sz="4400" dirty="0"/>
+              <a:t>[</a:t>
+            </a:r>
+            <a:r>
+              <a:rPr lang="en-US" sz="4400" dirty="0" smtClean="0">
+                <a:solidFill>
+                  <a:srgbClr val="0000FF"/>
+                </a:solidFill>
+              </a:rPr>
+              <a:t>(V,W)</a:t>
+            </a:r>
+            <a:r>
+              <a:rPr lang="en-US" sz="4400" dirty="0"/>
+              <a:t>]</a:t>
+            </a:r>
+            <a:r>
+              <a:rPr lang="en-US" sz="4400" dirty="0" smtClean="0"/>
+              <a:t> </a:t>
+            </a:r>
+            <a:r>
+              <a:rPr lang="en-US" sz="4400" dirty="0"/>
+              <a:t>= </a:t>
+            </a:r>
+            <a:r>
               <a:rPr lang="en-US" sz="4400" dirty="0">
                 <a:solidFill>
                   <a:srgbClr val="0000FF"/>
                 </a:solidFill>
               </a:rPr>
-              <a:t>(</a:t>
+              <a:t>1/</a:t>
             </a:r>
             <a:r>
               <a:rPr lang="en-US" sz="4400" dirty="0" err="1">
@@ -4491,59 +4994,7 @@
                   <a:srgbClr val="0000FF"/>
                 </a:solidFill>
               </a:rPr>
-              <a:t>u,v</a:t>
-            </a:r>
-            <a:r>
-              <a:rPr lang="en-US" sz="4400" dirty="0">
-                <a:solidFill>
-                  <a:srgbClr val="0000FF"/>
-                </a:solidFill>
-              </a:rPr>
-              <a:t>)</a:t>
-            </a:r>
-            <a:r>
-              <a:rPr lang="en-US" sz="4400" dirty="0"/>
-              <a:t> exists if link from page </a:t>
-            </a:r>
-            <a:r>
-              <a:rPr lang="en-US" sz="4400" dirty="0" err="1">
-                <a:solidFill>
-                  <a:srgbClr val="0000FF"/>
-                </a:solidFill>
-              </a:rPr>
-              <a:t>u</a:t>
-            </a:r>
-            <a:r>
-              <a:rPr lang="en-US" sz="4400" dirty="0"/>
-              <a:t> to page </a:t>
-            </a:r>
-            <a:r>
-              <a:rPr lang="en-US" sz="4400" dirty="0" err="1">
-                <a:solidFill>
-                  <a:srgbClr val="0000FF"/>
-                </a:solidFill>
-              </a:rPr>
-              <a:t>v</a:t>
-            </a:r>
-            <a:endParaRPr lang="en-US" sz="4400" dirty="0">
-              <a:solidFill>
-                <a:srgbClr val="0000FF"/>
-              </a:solidFill>
-            </a:endParaRPr>
-          </a:p>
-          <a:p>
-            <a:pPr eaLnBrk="1" hangingPunct="1">
-              <a:lnSpc>
-                <a:spcPct val="90000"/>
-              </a:lnSpc>
-            </a:pPr>
-            <a:r>
-              <a:rPr lang="en-US" sz="4400" dirty="0" err="1" smtClean="0"/>
-              <a:t>Pr</a:t>
-            </a:r>
-            <a:r>
-              <a:rPr lang="en-US" sz="4400" dirty="0"/>
-              <a:t>[</a:t>
+              <a:t>outdeg</a:t>
             </a:r>
             <a:r>
               <a:rPr lang="en-US" sz="4400" dirty="0" smtClean="0">
@@ -4551,51 +5002,7 @@
                   <a:srgbClr val="0000FF"/>
                 </a:solidFill>
               </a:rPr>
-              <a:t>(</a:t>
-            </a:r>
-            <a:r>
-              <a:rPr lang="en-US" sz="4400" dirty="0" err="1" smtClean="0">
-                <a:solidFill>
-                  <a:srgbClr val="0000FF"/>
-                </a:solidFill>
-              </a:rPr>
-              <a:t>u,v</a:t>
-            </a:r>
-            <a:r>
-              <a:rPr lang="en-US" sz="4400" dirty="0" smtClean="0">
-                <a:solidFill>
-                  <a:srgbClr val="0000FF"/>
-                </a:solidFill>
-              </a:rPr>
-              <a:t>)</a:t>
-            </a:r>
-            <a:r>
-              <a:rPr lang="en-US" sz="4400" dirty="0"/>
-              <a:t>]</a:t>
-            </a:r>
-            <a:r>
-              <a:rPr lang="en-US" sz="4400" dirty="0" smtClean="0"/>
-              <a:t> </a:t>
-            </a:r>
-            <a:r>
-              <a:rPr lang="en-US" sz="4400" dirty="0"/>
-              <a:t>= </a:t>
-            </a:r>
-            <a:r>
-              <a:rPr lang="en-US" sz="4400" dirty="0">
-                <a:solidFill>
-                  <a:srgbClr val="0000FF"/>
-                </a:solidFill>
-              </a:rPr>
-              <a:t>1/outdeg(u</a:t>
-            </a:r>
-            <a:r>
-              <a:rPr lang="en-US" sz="4400" dirty="0" smtClean="0">
-                <a:solidFill>
-                  <a:srgbClr val="0000FF"/>
-                </a:solidFill>
-              </a:rPr>
-              <a:t>)</a:t>
+              <a:t>(V)</a:t>
             </a:r>
             <a:endParaRPr lang="en-US" sz="4400" dirty="0">
               <a:solidFill>
@@ -4652,7 +5059,11 @@
             </a:pPr>
             <a:r>
               <a:rPr lang="en-US" dirty="0" smtClean="0"/>
-              <a:t>Albert R Meyer,               December 6, 2013</a:t>
+              <a:t>Albert R Meyer,               December </a:t>
+            </a:r>
+            <a:r>
+              <a:rPr lang="en-US" dirty="0" smtClean="0"/>
+              <a:t>11, 2013</a:t>
             </a:r>
             <a:endParaRPr lang="en-US" dirty="0"/>
           </a:p>
@@ -4692,7 +5103,7 @@
   <p:clrMapOvr>
     <a:masterClrMapping/>
   </p:clrMapOvr>
-  <p:transition xmlns:p14="http://schemas.microsoft.com/office/powerpoint/2010/main" spd="slow">
+  <p:transition xmlns:p14="http://schemas.microsoft.com/office/powerpoint/2010/main" spd="slow" advClick="0">
     <p:fade thruBlk="1"/>
   </p:transition>
   <p:timing>
@@ -4716,7 +5127,7 @@
                             </p:stCondLst>
                             <p:childTnLst>
                               <p:par>
-                                <p:cTn id="5" presetID="9" presetClass="entr" presetSubtype="0" fill="hold" grpId="0" nodeType="clickEffect">
+                                <p:cTn id="5" presetID="10" presetClass="entr" presetSubtype="0" fill="hold" grpId="0" nodeType="clickEffect">
                                   <p:stCondLst>
                                     <p:cond delay="0"/>
                                   </p:stCondLst>
@@ -4731,7 +5142,7 @@
                                         <p:tgtEl>
                                           <p:spTgt spid="22534">
                                             <p:txEl>
-                                              <p:pRg st="0" end="0"/>
+                                              <p:pRg st="1" end="1"/>
                                             </p:txEl>
                                           </p:spTgt>
                                         </p:tgtEl>
@@ -4743,13 +5154,13 @@
                                         <p:strVal val="visible"/>
                                       </p:to>
                                     </p:set>
-                                    <p:animEffect transition="in" filter="dissolve">
+                                    <p:animEffect transition="in" filter="fade">
                                       <p:cBhvr>
                                         <p:cTn id="7" dur="500"/>
                                         <p:tgtEl>
                                           <p:spTgt spid="22534">
                                             <p:txEl>
-                                              <p:pRg st="0" end="0"/>
+                                              <p:pRg st="1" end="1"/>
                                             </p:txEl>
                                           </p:spTgt>
                                         </p:tgtEl>
@@ -4777,7 +5188,7 @@
                             </p:stCondLst>
                             <p:childTnLst>
                               <p:par>
-                                <p:cTn id="10" presetID="9" presetClass="entr" presetSubtype="0" fill="hold" grpId="0" nodeType="clickEffect">
+                                <p:cTn id="10" presetID="10" presetClass="entr" presetSubtype="0" fill="hold" grpId="0" nodeType="clickEffect">
                                   <p:stCondLst>
                                     <p:cond delay="0"/>
                                   </p:stCondLst>
@@ -4792,7 +5203,7 @@
                                         <p:tgtEl>
                                           <p:spTgt spid="22534">
                                             <p:txEl>
-                                              <p:pRg st="1" end="1"/>
+                                              <p:pRg st="2" end="2"/>
                                             </p:txEl>
                                           </p:spTgt>
                                         </p:tgtEl>
@@ -4804,13 +5215,13 @@
                                         <p:strVal val="visible"/>
                                       </p:to>
                                     </p:set>
-                                    <p:animEffect transition="in" filter="dissolve">
+                                    <p:animEffect transition="in" filter="fade">
                                       <p:cBhvr>
                                         <p:cTn id="12" dur="500"/>
                                         <p:tgtEl>
                                           <p:spTgt spid="22534">
                                             <p:txEl>
-                                              <p:pRg st="1" end="1"/>
+                                              <p:pRg st="2" end="2"/>
                                             </p:txEl>
                                           </p:spTgt>
                                         </p:tgtEl>
@@ -4838,7 +5249,7 @@
                             </p:stCondLst>
                             <p:childTnLst>
                               <p:par>
-                                <p:cTn id="15" presetID="9" presetClass="entr" presetSubtype="0" fill="hold" grpId="0" nodeType="clickEffect">
+                                <p:cTn id="15" presetID="10" presetClass="entr" presetSubtype="0" fill="hold" grpId="0" nodeType="clickEffect">
                                   <p:stCondLst>
                                     <p:cond delay="0"/>
                                   </p:stCondLst>
@@ -4853,7 +5264,7 @@
                                         <p:tgtEl>
                                           <p:spTgt spid="22534">
                                             <p:txEl>
-                                              <p:pRg st="2" end="2"/>
+                                              <p:pRg st="3" end="3"/>
                                             </p:txEl>
                                           </p:spTgt>
                                         </p:tgtEl>
@@ -4865,13 +5276,13 @@
                                         <p:strVal val="visible"/>
                                       </p:to>
                                     </p:set>
-                                    <p:animEffect transition="in" filter="dissolve">
+                                    <p:animEffect transition="in" filter="fade">
                                       <p:cBhvr>
                                         <p:cTn id="17" dur="500"/>
                                         <p:tgtEl>
                                           <p:spTgt spid="22534">
                                             <p:txEl>
-                                              <p:pRg st="2" end="2"/>
+                                              <p:pRg st="3" end="3"/>
                                             </p:txEl>
                                           </p:spTgt>
                                         </p:tgtEl>
@@ -4899,7 +5310,7 @@
                             </p:stCondLst>
                             <p:childTnLst>
                               <p:par>
-                                <p:cTn id="20" presetID="9" presetClass="entr" presetSubtype="0" fill="hold" grpId="0" nodeType="clickEffect">
+                                <p:cTn id="20" presetID="22" presetClass="entr" presetSubtype="8" fill="hold" grpId="0" nodeType="clickEffect">
                                   <p:stCondLst>
                                     <p:cond delay="0"/>
                                   </p:stCondLst>
@@ -4914,7 +5325,7 @@
                                         <p:tgtEl>
                                           <p:spTgt spid="22534">
                                             <p:txEl>
-                                              <p:pRg st="3" end="3"/>
+                                              <p:pRg st="4" end="4"/>
                                             </p:txEl>
                                           </p:spTgt>
                                         </p:tgtEl>
@@ -4926,13 +5337,13 @@
                                         <p:strVal val="visible"/>
                                       </p:to>
                                     </p:set>
-                                    <p:animEffect transition="in" filter="dissolve">
+                                    <p:animEffect transition="in" filter="wipe(left)">
                                       <p:cBhvr>
-                                        <p:cTn id="22" dur="500"/>
+                                        <p:cTn id="22" dur="1000"/>
                                         <p:tgtEl>
                                           <p:spTgt spid="22534">
                                             <p:txEl>
-                                              <p:pRg st="3" end="3"/>
+                                              <p:pRg st="4" end="4"/>
                                             </p:txEl>
                                           </p:spTgt>
                                         </p:tgtEl>
@@ -5011,7 +5422,7 @@
           <a:p>
             <a:r>
               <a:rPr lang="en-US" dirty="0" smtClean="0"/>
-              <a:t>random-walk.</a:t>
+              <a:t>page-rank.</a:t>
             </a:r>
             <a:fld id="{42298CDA-044A-0949-8A0D-DDA7F6833251}" type="slidenum">
               <a:rPr lang="en-US" smtClean="0"/>
@@ -5054,11 +5465,7 @@
             </a:pPr>
             <a:r>
               <a:rPr lang="en-US" sz="4000" dirty="0" smtClean="0"/>
-              <a:t>To </a:t>
-            </a:r>
-            <a:r>
-              <a:rPr lang="en-US" sz="4000" dirty="0" smtClean="0"/>
-              <a:t>model </a:t>
+              <a:t>To model </a:t>
             </a:r>
             <a:r>
               <a:rPr lang="en-US" sz="4000" dirty="0" smtClean="0">
@@ -5072,7 +5479,6 @@
               <a:rPr lang="en-US" sz="4000" dirty="0" smtClean="0"/>
               <a:t>:</a:t>
             </a:r>
-            <a:endParaRPr lang="en-US" sz="4000" dirty="0" smtClean="0"/>
           </a:p>
           <a:p>
             <a:pPr eaLnBrk="1" hangingPunct="1">
@@ -5175,7 +5581,11 @@
             </a:pPr>
             <a:r>
               <a:rPr lang="en-US" dirty="0" smtClean="0"/>
-              <a:t>Albert R Meyer,               December 6, 2013</a:t>
+              <a:t>Albert R Meyer,               December </a:t>
+            </a:r>
+            <a:r>
+              <a:rPr lang="en-US" dirty="0" smtClean="0"/>
+              <a:t>11, 2013</a:t>
             </a:r>
             <a:endParaRPr lang="en-US" dirty="0"/>
           </a:p>
@@ -5183,7 +5593,7 @@
       </p:sp>
       <p:sp>
         <p:nvSpPr>
-          <p:cNvPr id="8" name="Rectangle 2"/>
+          <p:cNvPr id="9" name="Rectangle 2"/>
           <p:cNvSpPr>
             <a:spLocks noGrp="1" noChangeArrowheads="1"/>
           </p:cNvSpPr>
@@ -5194,7 +5604,7 @@
         <p:spPr>
           <a:xfrm>
             <a:off x="1519238" y="301625"/>
-            <a:ext cx="5872162" cy="993775"/>
+            <a:ext cx="7015162" cy="993775"/>
           </a:xfrm>
         </p:spPr>
         <p:txBody>
@@ -5203,9 +5613,10 @@
           <a:p>
             <a:pPr eaLnBrk="1" hangingPunct="1"/>
             <a:r>
-              <a:rPr lang="en-US" dirty="0"/>
-              <a:t>Google Page Rank</a:t>
-            </a:r>
+              <a:rPr lang="en-US" dirty="0" smtClean="0"/>
+              <a:t>Random Walk on the Web</a:t>
+            </a:r>
+            <a:endParaRPr lang="en-US" dirty="0"/>
           </a:p>
         </p:txBody>
       </p:sp>
@@ -5219,7 +5630,7 @@
   <p:clrMapOvr>
     <a:masterClrMapping/>
   </p:clrMapOvr>
-  <p:transition xmlns:p14="http://schemas.microsoft.com/office/powerpoint/2010/main" spd="slow">
+  <p:transition xmlns:p14="http://schemas.microsoft.com/office/powerpoint/2010/main" spd="slow" advClick="0">
     <p:fade thruBlk="1"/>
   </p:transition>
   <p:timing>
@@ -5477,7 +5888,7 @@
           <a:p>
             <a:r>
               <a:rPr lang="en-US" dirty="0" smtClean="0"/>
-              <a:t>random-walk.</a:t>
+              <a:t>page-rank.</a:t>
             </a:r>
             <a:fld id="{42298CDA-044A-0949-8A0D-DDA7F6833251}" type="slidenum">
               <a:rPr lang="en-US" smtClean="0"/>
@@ -5612,7 +6023,11 @@
             </a:pPr>
             <a:r>
               <a:rPr lang="en-US" dirty="0" smtClean="0"/>
-              <a:t>Albert R Meyer,               December 6, 2013</a:t>
+              <a:t>Albert R Meyer,               December </a:t>
+            </a:r>
+            <a:r>
+              <a:rPr lang="en-US" dirty="0" smtClean="0"/>
+              <a:t>11, 2013</a:t>
             </a:r>
             <a:endParaRPr lang="en-US" dirty="0"/>
           </a:p>
@@ -5975,7 +6390,7 @@
           <a:p>
             <a:r>
               <a:rPr lang="en-US" dirty="0" smtClean="0"/>
-              <a:t>random-walk.</a:t>
+              <a:t>page-rank.</a:t>
             </a:r>
             <a:fld id="{B826CD8C-0477-834C-B53A-FCC4FCE3844A}" type="slidenum">
               <a:rPr lang="en-US" smtClean="0"/>
@@ -6036,7 +6451,11 @@
             </a:pPr>
             <a:r>
               <a:rPr lang="en-US" dirty="0" smtClean="0"/>
-              <a:t>Albert R Meyer,        December 6, 2013</a:t>
+              <a:t>Albert R Meyer,        December </a:t>
+            </a:r>
+            <a:r>
+              <a:rPr lang="en-US" dirty="0" smtClean="0"/>
+              <a:t>11, 2013</a:t>
             </a:r>
             <a:endParaRPr lang="en-US" dirty="0"/>
           </a:p>
@@ -8430,7 +8849,7 @@
           <a:p>
             <a:r>
               <a:rPr lang="en-US" dirty="0" smtClean="0"/>
-              <a:t>random-walk.</a:t>
+              <a:t>page-rank.</a:t>
             </a:r>
             <a:fld id="{42298CDA-044A-0949-8A0D-DDA7F6833251}" type="slidenum">
               <a:rPr lang="en-US" smtClean="0"/>
@@ -8503,6 +8922,62 @@
             <a:endParaRPr lang="en-US" sz="5400" dirty="0"/>
           </a:p>
           <a:p>
+            <a:pPr algn="ctr" eaLnBrk="1" hangingPunct="1">
+              <a:lnSpc>
+                <a:spcPct val="90000"/>
+              </a:lnSpc>
+              <a:buFontTx/>
+              <a:buNone/>
+            </a:pPr>
+            <a:r>
+              <a:rPr lang="en-US" sz="5400" dirty="0" smtClean="0">
+                <a:solidFill>
+                  <a:srgbClr val="0000FF"/>
+                </a:solidFill>
+              </a:rPr>
+              <a:t>PageRank(V) ::</a:t>
+            </a:r>
+            <a:r>
+              <a:rPr lang="en-US" sz="5400" b="1" dirty="0" smtClean="0">
+                <a:solidFill>
+                  <a:srgbClr val="0000FF"/>
+                </a:solidFill>
+                <a:latin typeface="Euclid Symbol" charset="2"/>
+                <a:cs typeface="Euclid Symbol" charset="2"/>
+              </a:rPr>
+              <a:t>=</a:t>
+            </a:r>
+            <a:r>
+              <a:rPr lang="en-US" sz="5400" dirty="0" smtClean="0">
+                <a:solidFill>
+                  <a:srgbClr val="0000FF"/>
+                </a:solidFill>
+              </a:rPr>
+              <a:t> </a:t>
+            </a:r>
+            <a:r>
+              <a:rPr lang="en-US" sz="5400" dirty="0" err="1" smtClean="0">
+                <a:solidFill>
+                  <a:srgbClr val="0000FF"/>
+                </a:solidFill>
+              </a:rPr>
+              <a:t>s</a:t>
+            </a:r>
+            <a:r>
+              <a:rPr lang="en-US" sz="5400" baseline="-25000" dirty="0" err="1" smtClean="0">
+                <a:solidFill>
+                  <a:srgbClr val="0000FF"/>
+                </a:solidFill>
+              </a:rPr>
+              <a:t>V</a:t>
+            </a:r>
+            <a:endParaRPr lang="en-US" sz="5400" baseline="-25000" dirty="0" smtClean="0">
+              <a:solidFill>
+                <a:srgbClr val="0000FF"/>
+              </a:solidFill>
+            </a:endParaRPr>
+          </a:p>
+          <a:p>
             <a:pPr eaLnBrk="1" hangingPunct="1">
               <a:lnSpc>
                 <a:spcPct val="90000"/>
@@ -8511,8 +8986,24 @@
               <a:buNone/>
             </a:pPr>
             <a:r>
+              <a:rPr lang="en-US" sz="5400" dirty="0" smtClean="0"/>
+              <a:t>Rank </a:t>
+            </a:r>
+            <a:r>
+              <a:rPr lang="en-US" sz="5400" dirty="0" smtClean="0">
+                <a:solidFill>
+                  <a:srgbClr val="0000FF"/>
+                </a:solidFill>
+              </a:rPr>
+              <a:t>V</a:t>
+            </a:r>
+            <a:r>
+              <a:rPr lang="en-US" sz="5400" dirty="0" smtClean="0"/>
+              <a:t> </a:t>
+            </a:r>
+            <a:r>
               <a:rPr lang="en-US" sz="5400" dirty="0"/>
-              <a:t>Rank </a:t>
+              <a:t>above</a:t>
             </a:r>
             <a:r>
               <a:rPr lang="en-US" sz="5400" dirty="0">
@@ -8520,24 +9011,30 @@
                   <a:srgbClr val="0000FF"/>
                 </a:solidFill>
               </a:rPr>
-              <a:t>u</a:t>
-            </a:r>
-            <a:r>
-              <a:rPr lang="en-US" sz="5400" dirty="0"/>
-              <a:t> above</a:t>
-            </a:r>
-            <a:r>
-              <a:rPr lang="en-US" sz="5400" dirty="0">
+              <a:t> </a:t>
+            </a:r>
+            <a:r>
+              <a:rPr lang="en-US" sz="5400" dirty="0" smtClean="0">
                 <a:solidFill>
                   <a:srgbClr val="0000FF"/>
                 </a:solidFill>
               </a:rPr>
-              <a:t> v</a:t>
-            </a:r>
-            <a:r>
-              <a:rPr lang="en-US" sz="5400" dirty="0"/>
-              <a:t> if </a:t>
-            </a:r>
+              <a:t>W</a:t>
+            </a:r>
+            <a:r>
+              <a:rPr lang="en-US" sz="5400" dirty="0" smtClean="0"/>
+              <a:t> when</a:t>
+            </a:r>
+            <a:endParaRPr lang="en-US" sz="5400" dirty="0"/>
+          </a:p>
+          <a:p>
+            <a:pPr algn="ctr" eaLnBrk="1" hangingPunct="1">
+              <a:lnSpc>
+                <a:spcPct val="90000"/>
+              </a:lnSpc>
+              <a:buFontTx/>
+              <a:buNone/>
+            </a:pPr>
             <a:r>
               <a:rPr lang="en-US" sz="5400" dirty="0" err="1" smtClean="0">
                 <a:solidFill>
@@ -8552,7 +9049,7 @@
                   <a:srgbClr val="0000FF"/>
                 </a:solidFill>
               </a:rPr>
-              <a:t>u</a:t>
+              <a:t>V</a:t>
             </a:r>
             <a:r>
               <a:rPr lang="en-US" sz="5400" dirty="0" smtClean="0">
@@ -8565,7 +9062,7 @@
             <a:r>
               <a:rPr lang="en-US" sz="5400" b="1" dirty="0">
                 <a:solidFill>
-                  <a:schemeClr val="accent2"/>
+                  <a:srgbClr val="0000FF"/>
                 </a:solidFill>
                 <a:latin typeface="Euclid Symbol" charset="2"/>
                 <a:cs typeface="Euclid Symbol" charset="2"/>
@@ -8594,12 +9091,9 @@
                   <a:srgbClr val="0000FF"/>
                 </a:solidFill>
               </a:rPr>
-              <a:t>v</a:t>
-            </a:r>
-            <a:r>
-              <a:rPr lang="en-US" sz="5400" dirty="0"/>
-              <a:t>.</a:t>
-            </a:r>
+              <a:t>W</a:t>
+            </a:r>
+            <a:endParaRPr lang="en-US" sz="5400" dirty="0"/>
           </a:p>
         </p:txBody>
       </p:sp>
@@ -8650,15 +9144,97 @@
             </a:pPr>
             <a:r>
               <a:rPr lang="en-US" dirty="0" smtClean="0"/>
-              <a:t>Albert R Meyer,               December 6, 2013</a:t>
+              <a:t>Albert R Meyer,               December </a:t>
+            </a:r>
+            <a:r>
+              <a:rPr lang="en-US" dirty="0" smtClean="0"/>
+              <a:t>11, 2013</a:t>
             </a:r>
             <a:endParaRPr lang="en-US" dirty="0"/>
           </a:p>
         </p:txBody>
       </p:sp>
+      <p:grpSp>
+        <p:nvGrpSpPr>
+          <p:cNvPr id="6" name="Group 5"/>
+          <p:cNvGrpSpPr/>
+          <p:nvPr/>
+        </p:nvGrpSpPr>
+        <p:grpSpPr>
+          <a:xfrm>
+            <a:off x="7772400" y="1981200"/>
+            <a:ext cx="559243" cy="1015663"/>
+            <a:chOff x="7236844" y="3657600"/>
+            <a:chExt cx="559243" cy="1015663"/>
+          </a:xfrm>
+        </p:grpSpPr>
+        <p:sp>
+          <p:nvSpPr>
+            <p:cNvPr id="9" name="TextBox 8"/>
+            <p:cNvSpPr txBox="1"/>
+            <p:nvPr/>
+          </p:nvSpPr>
+          <p:spPr>
+            <a:xfrm>
+              <a:off x="7236844" y="3657600"/>
+              <a:ext cx="559243" cy="1015663"/>
+            </a:xfrm>
+            <a:prstGeom prst="rect">
+              <a:avLst/>
+            </a:prstGeom>
+            <a:noFill/>
+          </p:spPr>
+          <p:txBody>
+            <a:bodyPr wrap="none" rtlCol="0">
+              <a:spAutoFit/>
+            </a:bodyPr>
+            <a:lstStyle/>
+            <a:p>
+              <a:r>
+                <a:rPr lang="en-US" sz="6000" dirty="0">
+                  <a:solidFill>
+                    <a:srgbClr val="0000FF"/>
+                  </a:solidFill>
+                </a:rPr>
+                <a:t>s</a:t>
+              </a:r>
+              <a:endParaRPr lang="en-US" sz="6000" dirty="0"/>
+            </a:p>
+          </p:txBody>
+        </p:sp>
+        <p:cxnSp>
+          <p:nvCxnSpPr>
+            <p:cNvPr id="10" name="Straight Arrow Connector 9"/>
+            <p:cNvCxnSpPr/>
+            <p:nvPr/>
+          </p:nvCxnSpPr>
+          <p:spPr bwMode="auto">
+            <a:xfrm>
+              <a:off x="7389244" y="3886200"/>
+              <a:ext cx="381000" cy="0"/>
+            </a:xfrm>
+            <a:prstGeom prst="straightConnector1">
+              <a:avLst/>
+            </a:prstGeom>
+            <a:solidFill>
+              <a:schemeClr val="accent1"/>
+            </a:solidFill>
+            <a:ln w="38100" cap="flat" cmpd="sng" algn="ctr">
+              <a:solidFill>
+                <a:srgbClr val="0000FF"/>
+              </a:solidFill>
+              <a:prstDash val="solid"/>
+              <a:round/>
+              <a:headEnd type="none" w="med" len="med"/>
+              <a:tailEnd type="arrow" w="sm" len="sm"/>
+            </a:ln>
+            <a:effectLst/>
+          </p:spPr>
+        </p:cxnSp>
+      </p:grpSp>
       <p:sp>
         <p:nvSpPr>
-          <p:cNvPr id="8" name="Rectangle 2"/>
+          <p:cNvPr id="11" name="Rectangle 2"/>
           <p:cNvSpPr>
             <a:spLocks noGrp="1" noChangeArrowheads="1"/>
           </p:cNvSpPr>
@@ -8669,7 +9245,7 @@
         <p:spPr>
           <a:xfrm>
             <a:off x="1519238" y="301625"/>
-            <a:ext cx="7015162" cy="993775"/>
+            <a:ext cx="5872162" cy="993775"/>
           </a:xfrm>
         </p:spPr>
         <p:txBody>
@@ -8678,10 +9254,18 @@
           <a:p>
             <a:pPr eaLnBrk="1" hangingPunct="1"/>
             <a:r>
-              <a:rPr lang="en-US" dirty="0" smtClean="0"/>
+              <a:rPr lang="en-US" sz="5400" b="0" dirty="0" smtClean="0">
+                <a:solidFill>
+                  <a:srgbClr val="0000FF"/>
+                </a:solidFill>
+              </a:rPr>
               <a:t>PageRank</a:t>
             </a:r>
-            <a:endParaRPr lang="en-US" dirty="0"/>
+            <a:endParaRPr lang="en-US" sz="5400" b="0" dirty="0">
+              <a:solidFill>
+                <a:srgbClr val="0000FF"/>
+              </a:solidFill>
+            </a:endParaRPr>
           </a:p>
         </p:txBody>
       </p:sp>
@@ -8695,7 +9279,7 @@
   <p:clrMapOvr>
     <a:masterClrMapping/>
   </p:clrMapOvr>
-  <p:transition xmlns:p14="http://schemas.microsoft.com/office/powerpoint/2010/main" spd="slow">
+  <p:transition xmlns:p14="http://schemas.microsoft.com/office/powerpoint/2010/main" spd="slow" advClick="0">
     <p:fade thruBlk="1"/>
   </p:transition>
   <p:timing>
@@ -8719,7 +9303,7 @@
                             </p:stCondLst>
                             <p:childTnLst>
                               <p:par>
-                                <p:cTn id="5" presetID="9" presetClass="entr" presetSubtype="0" fill="hold" grpId="0" nodeType="clickEffect">
+                                <p:cTn id="5" presetID="10" presetClass="entr" presetSubtype="0" fill="hold" grpId="0" nodeType="clickEffect">
                                   <p:stCondLst>
                                     <p:cond delay="0"/>
                                   </p:stCondLst>
@@ -8727,67 +9311,6 @@
                                     <p:set>
                                       <p:cBhvr>
                                         <p:cTn id="6" dur="1" fill="hold">
-                                          <p:stCondLst>
-                                            <p:cond delay="0"/>
-                                          </p:stCondLst>
-                                        </p:cTn>
-                                        <p:tgtEl>
-                                          <p:spTgt spid="22534">
-                                            <p:txEl>
-                                              <p:pRg st="0" end="0"/>
-                                            </p:txEl>
-                                          </p:spTgt>
-                                        </p:tgtEl>
-                                        <p:attrNameLst>
-                                          <p:attrName>style.visibility</p:attrName>
-                                        </p:attrNameLst>
-                                      </p:cBhvr>
-                                      <p:to>
-                                        <p:strVal val="visible"/>
-                                      </p:to>
-                                    </p:set>
-                                    <p:animEffect transition="in" filter="dissolve">
-                                      <p:cBhvr>
-                                        <p:cTn id="7" dur="500"/>
-                                        <p:tgtEl>
-                                          <p:spTgt spid="22534">
-                                            <p:txEl>
-                                              <p:pRg st="0" end="0"/>
-                                            </p:txEl>
-                                          </p:spTgt>
-                                        </p:tgtEl>
-                                      </p:cBhvr>
-                                    </p:animEffect>
-                                  </p:childTnLst>
-                                </p:cTn>
-                              </p:par>
-                            </p:childTnLst>
-                          </p:cTn>
-                        </p:par>
-                      </p:childTnLst>
-                    </p:cTn>
-                  </p:par>
-                  <p:par>
-                    <p:cTn id="8" fill="hold">
-                      <p:stCondLst>
-                        <p:cond delay="indefinite"/>
-                      </p:stCondLst>
-                      <p:childTnLst>
-                        <p:par>
-                          <p:cTn id="9" fill="hold">
-                            <p:stCondLst>
-                              <p:cond delay="0"/>
-                            </p:stCondLst>
-                            <p:childTnLst>
-                              <p:par>
-                                <p:cTn id="10" presetID="9" presetClass="entr" presetSubtype="0" fill="hold" grpId="0" nodeType="clickEffect">
-                                  <p:stCondLst>
-                                    <p:cond delay="0"/>
-                                  </p:stCondLst>
-                                  <p:childTnLst>
-                                    <p:set>
-                                      <p:cBhvr>
-                                        <p:cTn id="11" dur="1" fill="hold">
                                           <p:stCondLst>
                                             <p:cond delay="0"/>
                                           </p:stCondLst>
@@ -8807,15 +9330,50 @@
                                         <p:strVal val="visible"/>
                                       </p:to>
                                     </p:set>
-                                    <p:animEffect transition="in" filter="dissolve">
+                                    <p:animEffect transition="in" filter="fade">
                                       <p:cBhvr>
-                                        <p:cTn id="12" dur="500"/>
+                                        <p:cTn id="7" dur="500"/>
                                         <p:tgtEl>
                                           <p:spTgt spid="22534">
                                             <p:txEl>
                                               <p:pRg st="1" end="1"/>
                                             </p:txEl>
                                           </p:spTgt>
+                                        </p:tgtEl>
+                                      </p:cBhvr>
+                                    </p:animEffect>
+                                  </p:childTnLst>
+                                </p:cTn>
+                              </p:par>
+                              <p:par>
+                                <p:cTn id="8" presetID="10" presetClass="entr" presetSubtype="0" fill="hold" nodeType="withEffect">
+                                  <p:stCondLst>
+                                    <p:cond delay="0"/>
+                                  </p:stCondLst>
+                                  <p:childTnLst>
+                                    <p:set>
+                                      <p:cBhvr>
+                                        <p:cTn id="9" dur="1" fill="hold">
+                                          <p:stCondLst>
+                                            <p:cond delay="0"/>
+                                          </p:stCondLst>
+                                        </p:cTn>
+                                        <p:tgtEl>
+                                          <p:spTgt spid="6"/>
+                                        </p:tgtEl>
+                                        <p:attrNameLst>
+                                          <p:attrName>style.visibility</p:attrName>
+                                        </p:attrNameLst>
+                                      </p:cBhvr>
+                                      <p:to>
+                                        <p:strVal val="visible"/>
+                                      </p:to>
+                                    </p:set>
+                                    <p:animEffect transition="in" filter="fade">
+                                      <p:cBhvr>
+                                        <p:cTn id="10" dur="1000"/>
+                                        <p:tgtEl>
+                                          <p:spTgt spid="6"/>
                                         </p:tgtEl>
                                       </p:cBhvr>
                                     </p:animEffect>
@@ -8829,26 +9387,26 @@
                     </p:cTn>
                   </p:par>
                   <p:par>
-                    <p:cTn id="13" fill="hold">
+                    <p:cTn id="11" fill="hold">
                       <p:stCondLst>
                         <p:cond delay="indefinite"/>
                       </p:stCondLst>
                       <p:childTnLst>
                         <p:par>
-                          <p:cTn id="14" fill="hold">
+                          <p:cTn id="12" fill="hold">
                             <p:stCondLst>
                               <p:cond delay="0"/>
                             </p:stCondLst>
                             <p:childTnLst>
                               <p:par>
-                                <p:cTn id="15" presetID="9" presetClass="entr" presetSubtype="0" fill="hold" grpId="0" nodeType="clickEffect">
+                                <p:cTn id="13" presetID="10" presetClass="entr" presetSubtype="0" fill="hold" grpId="0" nodeType="clickEffect">
                                   <p:stCondLst>
                                     <p:cond delay="0"/>
                                   </p:stCondLst>
                                   <p:childTnLst>
                                     <p:set>
                                       <p:cBhvr>
-                                        <p:cTn id="16" dur="1" fill="hold">
+                                        <p:cTn id="14" dur="1" fill="hold">
                                           <p:stCondLst>
                                             <p:cond delay="0"/>
                                           </p:stCondLst>
@@ -8868,13 +9426,135 @@
                                         <p:strVal val="visible"/>
                                       </p:to>
                                     </p:set>
-                                    <p:animEffect transition="in" filter="dissolve">
+                                    <p:animEffect transition="in" filter="fade">
                                       <p:cBhvr>
-                                        <p:cTn id="17" dur="500"/>
+                                        <p:cTn id="15" dur="500"/>
                                         <p:tgtEl>
                                           <p:spTgt spid="22534">
                                             <p:txEl>
                                               <p:pRg st="2" end="2"/>
+                                            </p:txEl>
+                                          </p:spTgt>
+                                        </p:tgtEl>
+                                      </p:cBhvr>
+                                    </p:animEffect>
+                                  </p:childTnLst>
+                                </p:cTn>
+                              </p:par>
+                            </p:childTnLst>
+                          </p:cTn>
+                        </p:par>
+                      </p:childTnLst>
+                    </p:cTn>
+                  </p:par>
+                  <p:par>
+                    <p:cTn id="16" fill="hold">
+                      <p:stCondLst>
+                        <p:cond delay="indefinite"/>
+                      </p:stCondLst>
+                      <p:childTnLst>
+                        <p:par>
+                          <p:cTn id="17" fill="hold">
+                            <p:stCondLst>
+                              <p:cond delay="0"/>
+                            </p:stCondLst>
+                            <p:childTnLst>
+                              <p:par>
+                                <p:cTn id="18" presetID="10" presetClass="entr" presetSubtype="0" fill="hold" grpId="0" nodeType="clickEffect">
+                                  <p:stCondLst>
+                                    <p:cond delay="0"/>
+                                  </p:stCondLst>
+                                  <p:childTnLst>
+                                    <p:set>
+                                      <p:cBhvr>
+                                        <p:cTn id="19" dur="1" fill="hold">
+                                          <p:stCondLst>
+                                            <p:cond delay="0"/>
+                                          </p:stCondLst>
+                                        </p:cTn>
+                                        <p:tgtEl>
+                                          <p:spTgt spid="22534">
+                                            <p:txEl>
+                                              <p:pRg st="3" end="3"/>
+                                            </p:txEl>
+                                          </p:spTgt>
+                                        </p:tgtEl>
+                                        <p:attrNameLst>
+                                          <p:attrName>style.visibility</p:attrName>
+                                        </p:attrNameLst>
+                                      </p:cBhvr>
+                                      <p:to>
+                                        <p:strVal val="visible"/>
+                                      </p:to>
+                                    </p:set>
+                                    <p:animEffect transition="in" filter="fade">
+                                      <p:cBhvr>
+                                        <p:cTn id="20" dur="500"/>
+                                        <p:tgtEl>
+                                          <p:spTgt spid="22534">
+                                            <p:txEl>
+                                              <p:pRg st="3" end="3"/>
+                                            </p:txEl>
+                                          </p:spTgt>
+                                        </p:tgtEl>
+                                      </p:cBhvr>
+                                    </p:animEffect>
+                                  </p:childTnLst>
+                                </p:cTn>
+                              </p:par>
+                            </p:childTnLst>
+                          </p:cTn>
+                        </p:par>
+                      </p:childTnLst>
+                    </p:cTn>
+                  </p:par>
+                  <p:par>
+                    <p:cTn id="21" fill="hold">
+                      <p:stCondLst>
+                        <p:cond delay="indefinite"/>
+                      </p:stCondLst>
+                      <p:childTnLst>
+                        <p:par>
+                          <p:cTn id="22" fill="hold">
+                            <p:stCondLst>
+                              <p:cond delay="0"/>
+                            </p:stCondLst>
+                            <p:childTnLst>
+                              <p:par>
+                                <p:cTn id="23" presetID="10" presetClass="entr" presetSubtype="0" fill="hold" grpId="0" nodeType="clickEffect">
+                                  <p:stCondLst>
+                                    <p:cond delay="0"/>
+                                  </p:stCondLst>
+                                  <p:childTnLst>
+                                    <p:set>
+                                      <p:cBhvr>
+                                        <p:cTn id="24" dur="1" fill="hold">
+                                          <p:stCondLst>
+                                            <p:cond delay="0"/>
+                                          </p:stCondLst>
+                                        </p:cTn>
+                                        <p:tgtEl>
+                                          <p:spTgt spid="22534">
+                                            <p:txEl>
+                                              <p:pRg st="4" end="4"/>
+                                            </p:txEl>
+                                          </p:spTgt>
+                                        </p:tgtEl>
+                                        <p:attrNameLst>
+                                          <p:attrName>style.visibility</p:attrName>
+                                        </p:attrNameLst>
+                                      </p:cBhvr>
+                                      <p:to>
+                                        <p:strVal val="visible"/>
+                                      </p:to>
+                                    </p:set>
+                                    <p:animEffect transition="in" filter="fade">
+                                      <p:cBhvr>
+                                        <p:cTn id="25" dur="500"/>
+                                        <p:tgtEl>
+                                          <p:spTgt spid="22534">
+                                            <p:txEl>
+                                              <p:pRg st="4" end="4"/>
                                             </p:txEl>
                                           </p:spTgt>
                                         </p:tgtEl>
@@ -8959,15 +9639,7 @@
             </a:pPr>
             <a:r>
               <a:rPr lang="en-US" sz="4400" dirty="0" smtClean="0"/>
-              <a:t>* Creating </a:t>
-            </a:r>
-            <a:r>
-              <a:rPr lang="en-US" sz="4400" dirty="0" smtClean="0"/>
-              <a:t>fake nodes </a:t>
-            </a:r>
-            <a:r>
-              <a:rPr lang="en-US" sz="4400" dirty="0" smtClean="0"/>
-              <a:t>   </a:t>
+              <a:t>* Creating fake nodes    </a:t>
             </a:r>
           </a:p>
           <a:p>
@@ -8980,15 +9652,7 @@
             </a:r>
             <a:r>
               <a:rPr lang="en-US" sz="4400" dirty="0" smtClean="0"/>
-              <a:t>   </a:t>
-            </a:r>
-            <a:r>
-              <a:rPr lang="en-US" sz="4400" dirty="0" smtClean="0"/>
-              <a:t>pointing </a:t>
-            </a:r>
-            <a:r>
-              <a:rPr lang="en-US" sz="4400" dirty="0" smtClean="0"/>
-              <a:t>to self</a:t>
+              <a:t>   pointing to self</a:t>
             </a:r>
           </a:p>
           <a:p>
@@ -8997,11 +9661,7 @@
             </a:pPr>
             <a:r>
               <a:rPr lang="en-US" sz="4400" dirty="0" smtClean="0"/>
-              <a:t>* A</a:t>
-            </a:r>
-            <a:r>
-              <a:rPr lang="en-US" sz="4400" dirty="0" smtClean="0"/>
-              <a:t>dding links to important  </a:t>
+              <a:t>* Adding links to important  </a:t>
             </a:r>
           </a:p>
           <a:p>
@@ -9014,11 +9674,7 @@
             </a:r>
             <a:r>
               <a:rPr lang="en-US" sz="4400" dirty="0" smtClean="0"/>
-              <a:t>   </a:t>
-            </a:r>
-            <a:r>
-              <a:rPr lang="en-US" sz="4400" dirty="0" smtClean="0"/>
-              <a:t>nodes</a:t>
+              <a:t>   nodes</a:t>
             </a:r>
           </a:p>
           <a:p>
@@ -9030,10 +9686,18 @@
               <a:t>won’t help improve </a:t>
             </a:r>
             <a:r>
-              <a:rPr lang="en-US" sz="4400" dirty="0" err="1" smtClean="0"/>
-              <a:t>Pagerank</a:t>
-            </a:r>
-            <a:endParaRPr lang="en-US" sz="4400" dirty="0"/>
+              <a:rPr lang="en-US" sz="4400" dirty="0" smtClean="0">
+                <a:solidFill>
+                  <a:srgbClr val="0000FF"/>
+                </a:solidFill>
+              </a:rPr>
+              <a:t>PageRank</a:t>
+            </a:r>
+            <a:endParaRPr lang="en-US" sz="4400" dirty="0">
+              <a:solidFill>
+                <a:srgbClr val="0000FF"/>
+              </a:solidFill>
+            </a:endParaRPr>
           </a:p>
         </p:txBody>
       </p:sp>
@@ -9056,8 +9720,8 @@
               <a:defRPr/>
             </a:pPr>
             <a:r>
-              <a:rPr lang="en-US" smtClean="0"/>
-              <a:t>random-walk.</a:t>
+              <a:rPr lang="en-US" dirty="0" smtClean="0"/>
+              <a:t>page-rank.</a:t>
             </a:r>
             <a:fld id="{E877D3CB-F960-BD47-98A7-06971C504846}" type="slidenum">
               <a:rPr lang="en-US" smtClean="0"/>
@@ -9066,7 +9730,7 @@
               </a:pPr>
               <a:t>8</a:t>
             </a:fld>
-            <a:endParaRPr lang="en-US" smtClean="0"/>
+            <a:endParaRPr lang="en-US" dirty="0" smtClean="0"/>
           </a:p>
           <a:p>
             <a:pPr>
@@ -9127,7 +9791,6 @@
               <a:rPr lang="en-US" dirty="0"/>
               <a:t>Resistance to scamming</a:t>
             </a:r>
-            <a:endParaRPr lang="en-US" dirty="0"/>
           </a:p>
         </p:txBody>
       </p:sp>
@@ -9141,18 +9804,1541 @@
   <p:clrMapOvr>
     <a:masterClrMapping/>
   </p:clrMapOvr>
-  <mc:AlternateContent xmlns:mc="http://schemas.openxmlformats.org/markup-compatibility/2006">
-    <mc:Choice xmlns:p14="http://schemas.microsoft.com/office/powerpoint/2010/main" Requires="p14">
-      <p:transition spd="slow" p14:dur="2000"/>
+  <mc:AlternateContent xmlns:mc="http://schemas.openxmlformats.org/markup-compatibility/2006" xmlns:p14="http://schemas.microsoft.com/office/powerpoint/2010/main">
+    <mc:Choice Requires="p14">
+      <p:transition spd="med" p14:dur="700" advClick="0">
+        <p:fade/>
+      </p:transition>
     </mc:Choice>
-    <mc:Fallback>
-      <p:transition xmlns:p14="http://schemas.microsoft.com/office/powerpoint/2010/main" spd="slow"/>
+    <mc:Fallback xmlns="">
+      <p:transition xmlns:p14="http://schemas.microsoft.com/office/powerpoint/2010/main" spd="med" advClick="0">
+        <p:fade/>
+      </p:transition>
     </mc:Fallback>
   </mc:AlternateContent>
   <p:timing>
     <p:tnLst>
       <p:par>
-        <p:cTn xmlns:p14="http://schemas.microsoft.com/office/powerpoint/2010/main" id="1" dur="indefinite" restart="never" nodeType="tmRoot"/>
+        <p:cTn xmlns:p14="http://schemas.microsoft.com/office/powerpoint/2010/main" id="1" dur="indefinite" restart="never" nodeType="tmRoot">
+          <p:childTnLst>
+            <p:seq concurrent="1" nextAc="seek">
+              <p:cTn id="2" dur="indefinite" nodeType="mainSeq">
+                <p:childTnLst>
+                  <p:par>
+                    <p:cTn id="3" fill="hold">
+                      <p:stCondLst>
+                        <p:cond delay="indefinite"/>
+                      </p:stCondLst>
+                      <p:childTnLst>
+                        <p:par>
+                          <p:cTn id="4" fill="hold">
+                            <p:stCondLst>
+                              <p:cond delay="0"/>
+                            </p:stCondLst>
+                            <p:childTnLst>
+                              <p:par>
+                                <p:cTn id="5" presetID="10" presetClass="entr" presetSubtype="0" fill="hold" grpId="0" nodeType="clickEffect">
+                                  <p:stCondLst>
+                                    <p:cond delay="0"/>
+                                  </p:stCondLst>
+                                  <p:childTnLst>
+                                    <p:set>
+                                      <p:cBhvr>
+                                        <p:cTn id="6" dur="1" fill="hold">
+                                          <p:stCondLst>
+                                            <p:cond delay="0"/>
+                                          </p:stCondLst>
+                                        </p:cTn>
+                                        <p:tgtEl>
+                                          <p:spTgt spid="3">
+                                            <p:txEl>
+                                              <p:pRg st="0" end="0"/>
+                                            </p:txEl>
+                                          </p:spTgt>
+                                        </p:tgtEl>
+                                        <p:attrNameLst>
+                                          <p:attrName>style.visibility</p:attrName>
+                                        </p:attrNameLst>
+                                      </p:cBhvr>
+                                      <p:to>
+                                        <p:strVal val="visible"/>
+                                      </p:to>
+                                    </p:set>
+                                    <p:animEffect transition="in" filter="fade">
+                                      <p:cBhvr>
+                                        <p:cTn id="7" dur="500"/>
+                                        <p:tgtEl>
+                                          <p:spTgt spid="3">
+                                            <p:txEl>
+                                              <p:pRg st="0" end="0"/>
+                                            </p:txEl>
+                                          </p:spTgt>
+                                        </p:tgtEl>
+                                      </p:cBhvr>
+                                    </p:animEffect>
+                                  </p:childTnLst>
+                                </p:cTn>
+                              </p:par>
+                              <p:par>
+                                <p:cTn id="8" presetID="10" presetClass="entr" presetSubtype="0" fill="hold" grpId="0" nodeType="withEffect">
+                                  <p:stCondLst>
+                                    <p:cond delay="0"/>
+                                  </p:stCondLst>
+                                  <p:childTnLst>
+                                    <p:set>
+                                      <p:cBhvr>
+                                        <p:cTn id="9" dur="1" fill="hold">
+                                          <p:stCondLst>
+                                            <p:cond delay="0"/>
+                                          </p:stCondLst>
+                                        </p:cTn>
+                                        <p:tgtEl>
+                                          <p:spTgt spid="3">
+                                            <p:txEl>
+                                              <p:pRg st="1" end="1"/>
+                                            </p:txEl>
+                                          </p:spTgt>
+                                        </p:tgtEl>
+                                        <p:attrNameLst>
+                                          <p:attrName>style.visibility</p:attrName>
+                                        </p:attrNameLst>
+                                      </p:cBhvr>
+                                      <p:to>
+                                        <p:strVal val="visible"/>
+                                      </p:to>
+                                    </p:set>
+                                    <p:animEffect transition="in" filter="fade">
+                                      <p:cBhvr>
+                                        <p:cTn id="10" dur="500"/>
+                                        <p:tgtEl>
+                                          <p:spTgt spid="3">
+                                            <p:txEl>
+                                              <p:pRg st="1" end="1"/>
+                                            </p:txEl>
+                                          </p:spTgt>
+                                        </p:tgtEl>
+                                      </p:cBhvr>
+                                    </p:animEffect>
+                                  </p:childTnLst>
+                                </p:cTn>
+                              </p:par>
+                            </p:childTnLst>
+                          </p:cTn>
+                        </p:par>
+                      </p:childTnLst>
+                    </p:cTn>
+                  </p:par>
+                  <p:par>
+                    <p:cTn id="11" fill="hold">
+                      <p:stCondLst>
+                        <p:cond delay="indefinite"/>
+                      </p:stCondLst>
+                      <p:childTnLst>
+                        <p:par>
+                          <p:cTn id="12" fill="hold">
+                            <p:stCondLst>
+                              <p:cond delay="0"/>
+                            </p:stCondLst>
+                            <p:childTnLst>
+                              <p:par>
+                                <p:cTn id="13" presetID="10" presetClass="entr" presetSubtype="0" fill="hold" grpId="0" nodeType="clickEffect">
+                                  <p:stCondLst>
+                                    <p:cond delay="0"/>
+                                  </p:stCondLst>
+                                  <p:childTnLst>
+                                    <p:set>
+                                      <p:cBhvr>
+                                        <p:cTn id="14" dur="1" fill="hold">
+                                          <p:stCondLst>
+                                            <p:cond delay="0"/>
+                                          </p:stCondLst>
+                                        </p:cTn>
+                                        <p:tgtEl>
+                                          <p:spTgt spid="3">
+                                            <p:txEl>
+                                              <p:pRg st="2" end="2"/>
+                                            </p:txEl>
+                                          </p:spTgt>
+                                        </p:tgtEl>
+                                        <p:attrNameLst>
+                                          <p:attrName>style.visibility</p:attrName>
+                                        </p:attrNameLst>
+                                      </p:cBhvr>
+                                      <p:to>
+                                        <p:strVal val="visible"/>
+                                      </p:to>
+                                    </p:set>
+                                    <p:animEffect transition="in" filter="fade">
+                                      <p:cBhvr>
+                                        <p:cTn id="15" dur="500"/>
+                                        <p:tgtEl>
+                                          <p:spTgt spid="3">
+                                            <p:txEl>
+                                              <p:pRg st="2" end="2"/>
+                                            </p:txEl>
+                                          </p:spTgt>
+                                        </p:tgtEl>
+                                      </p:cBhvr>
+                                    </p:animEffect>
+                                  </p:childTnLst>
+                                </p:cTn>
+                              </p:par>
+                              <p:par>
+                                <p:cTn id="16" presetID="10" presetClass="entr" presetSubtype="0" fill="hold" grpId="0" nodeType="withEffect">
+                                  <p:stCondLst>
+                                    <p:cond delay="0"/>
+                                  </p:stCondLst>
+                                  <p:childTnLst>
+                                    <p:set>
+                                      <p:cBhvr>
+                                        <p:cTn id="17" dur="1" fill="hold">
+                                          <p:stCondLst>
+                                            <p:cond delay="0"/>
+                                          </p:stCondLst>
+                                        </p:cTn>
+                                        <p:tgtEl>
+                                          <p:spTgt spid="3">
+                                            <p:txEl>
+                                              <p:pRg st="3" end="3"/>
+                                            </p:txEl>
+                                          </p:spTgt>
+                                        </p:tgtEl>
+                                        <p:attrNameLst>
+                                          <p:attrName>style.visibility</p:attrName>
+                                        </p:attrNameLst>
+                                      </p:cBhvr>
+                                      <p:to>
+                                        <p:strVal val="visible"/>
+                                      </p:to>
+                                    </p:set>
+                                    <p:animEffect transition="in" filter="fade">
+                                      <p:cBhvr>
+                                        <p:cTn id="18" dur="500"/>
+                                        <p:tgtEl>
+                                          <p:spTgt spid="3">
+                                            <p:txEl>
+                                              <p:pRg st="3" end="3"/>
+                                            </p:txEl>
+                                          </p:spTgt>
+                                        </p:tgtEl>
+                                      </p:cBhvr>
+                                    </p:animEffect>
+                                  </p:childTnLst>
+                                </p:cTn>
+                              </p:par>
+                            </p:childTnLst>
+                          </p:cTn>
+                        </p:par>
+                      </p:childTnLst>
+                    </p:cTn>
+                  </p:par>
+                  <p:par>
+                    <p:cTn id="19" fill="hold">
+                      <p:stCondLst>
+                        <p:cond delay="indefinite"/>
+                      </p:stCondLst>
+                      <p:childTnLst>
+                        <p:par>
+                          <p:cTn id="20" fill="hold">
+                            <p:stCondLst>
+                              <p:cond delay="0"/>
+                            </p:stCondLst>
+                            <p:childTnLst>
+                              <p:par>
+                                <p:cTn id="21" presetID="10" presetClass="entr" presetSubtype="0" fill="hold" grpId="0" nodeType="clickEffect">
+                                  <p:stCondLst>
+                                    <p:cond delay="0"/>
+                                  </p:stCondLst>
+                                  <p:childTnLst>
+                                    <p:set>
+                                      <p:cBhvr>
+                                        <p:cTn id="22" dur="1" fill="hold">
+                                          <p:stCondLst>
+                                            <p:cond delay="0"/>
+                                          </p:stCondLst>
+                                        </p:cTn>
+                                        <p:tgtEl>
+                                          <p:spTgt spid="3">
+                                            <p:txEl>
+                                              <p:pRg st="4" end="4"/>
+                                            </p:txEl>
+                                          </p:spTgt>
+                                        </p:tgtEl>
+                                        <p:attrNameLst>
+                                          <p:attrName>style.visibility</p:attrName>
+                                        </p:attrNameLst>
+                                      </p:cBhvr>
+                                      <p:to>
+                                        <p:strVal val="visible"/>
+                                      </p:to>
+                                    </p:set>
+                                    <p:animEffect transition="in" filter="fade">
+                                      <p:cBhvr>
+                                        <p:cTn id="23" dur="500"/>
+                                        <p:tgtEl>
+                                          <p:spTgt spid="3">
+                                            <p:txEl>
+                                              <p:pRg st="4" end="4"/>
+                                            </p:txEl>
+                                          </p:spTgt>
+                                        </p:tgtEl>
+                                      </p:cBhvr>
+                                    </p:animEffect>
+                                  </p:childTnLst>
+                                </p:cTn>
+                              </p:par>
+                            </p:childTnLst>
+                          </p:cTn>
+                        </p:par>
+                      </p:childTnLst>
+                    </p:cTn>
+                  </p:par>
+                </p:childTnLst>
+              </p:cTn>
+              <p:prevCondLst>
+                <p:cond evt="onPrev" delay="0">
+                  <p:tgtEl>
+                    <p:sldTgt/>
+                  </p:tgtEl>
+                </p:cond>
+              </p:prevCondLst>
+              <p:nextCondLst>
+                <p:cond evt="onNext" delay="0">
+                  <p:tgtEl>
+                    <p:sldTgt/>
+                  </p:tgtEl>
+                </p:cond>
+              </p:nextCondLst>
+            </p:seq>
+          </p:childTnLst>
+        </p:cTn>
+      </p:par>
+    </p:tnLst>
+    <p:bldLst>
+      <p:bldP spid="3" grpId="0" build="p"/>
+    </p:bldLst>
+  </p:timing>
+</p:sld>
+</file>
+
+<file path=ppt/slides/slide9.xml><?xml version="1.0" encoding="utf-8"?>
+<p:sld xmlns:a="http://schemas.openxmlformats.org/drawingml/2006/main" xmlns:r="http://schemas.openxmlformats.org/officeDocument/2006/relationships" xmlns:p="http://schemas.openxmlformats.org/presentationml/2006/main">
+  <p:cSld>
+    <p:spTree>
+      <p:nvGrpSpPr>
+        <p:cNvPr id="1" name=""/>
+        <p:cNvGrpSpPr/>
+        <p:nvPr/>
+      </p:nvGrpSpPr>
+      <p:grpSpPr>
+        <a:xfrm>
+          <a:off x="0" y="0"/>
+          <a:ext cx="0" cy="0"/>
+          <a:chOff x="0" y="0"/>
+          <a:chExt cx="0" cy="0"/>
+        </a:xfrm>
+      </p:grpSpPr>
+      <p:sp>
+        <p:nvSpPr>
+          <p:cNvPr id="6" name="TextBox 5"/>
+          <p:cNvSpPr txBox="1"/>
+          <p:nvPr/>
+        </p:nvSpPr>
+        <p:spPr>
+          <a:xfrm>
+            <a:off x="228600" y="990600"/>
+            <a:ext cx="8534400" cy="4967513"/>
+          </a:xfrm>
+          <a:prstGeom prst="rect">
+            <a:avLst/>
+          </a:prstGeom>
+          <a:noFill/>
+        </p:spPr>
+        <p:txBody>
+          <a:bodyPr wrap="square" rtlCol="0">
+            <a:spAutoFit/>
+          </a:bodyPr>
+          <a:lstStyle/>
+          <a:p>
+            <a:r>
+              <a:rPr lang="en-US" sz="4400" dirty="0" smtClean="0"/>
+              <a:t>ensures</a:t>
+            </a:r>
+            <a:endParaRPr lang="en-US" sz="4400" dirty="0"/>
+          </a:p>
+          <a:p>
+            <a:r>
+              <a:rPr lang="en-US" sz="4400" dirty="0" smtClean="0"/>
+              <a:t> * </a:t>
+            </a:r>
+            <a:r>
+              <a:rPr lang="en-US" sz="4400" dirty="0" smtClean="0">
+                <a:solidFill>
+                  <a:srgbClr val="008000"/>
+                </a:solidFill>
+              </a:rPr>
+              <a:t>unique</a:t>
+            </a:r>
+            <a:r>
+              <a:rPr lang="en-US" sz="4400" dirty="0" smtClean="0"/>
+              <a:t> stable distribution</a:t>
+            </a:r>
+          </a:p>
+          <a:p>
+            <a:r>
+              <a:rPr lang="en-US" sz="4400" dirty="0"/>
+              <a:t> </a:t>
+            </a:r>
+            <a:r>
+              <a:rPr lang="en-US" sz="4400" dirty="0" smtClean="0"/>
+              <a:t>* </a:t>
+            </a:r>
+            <a:r>
+              <a:rPr lang="en-US" sz="4400" dirty="0" smtClean="0">
+                <a:solidFill>
+                  <a:srgbClr val="008000"/>
+                </a:solidFill>
+              </a:rPr>
+              <a:t>every</a:t>
+            </a:r>
+            <a:r>
+              <a:rPr lang="en-US" sz="4400" dirty="0" smtClean="0"/>
+              <a:t> initial distribution</a:t>
+            </a:r>
+          </a:p>
+          <a:p>
+            <a:pPr>
+              <a:lnSpc>
+                <a:spcPct val="80000"/>
+              </a:lnSpc>
+            </a:pPr>
+            <a:r>
+              <a:rPr lang="en-US" sz="4400" dirty="0" smtClean="0"/>
+              <a:t>     </a:t>
+            </a:r>
+            <a:r>
+              <a:rPr lang="en-US" sz="4400" dirty="0" smtClean="0">
+                <a:solidFill>
+                  <a:srgbClr val="008000"/>
+                </a:solidFill>
+              </a:rPr>
+              <a:t>converges</a:t>
+            </a:r>
+            <a:r>
+              <a:rPr lang="en-US" sz="4400" dirty="0" smtClean="0"/>
+              <a:t> to</a:t>
+            </a:r>
+          </a:p>
+          <a:p>
+            <a:pPr>
+              <a:lnSpc>
+                <a:spcPct val="80000"/>
+              </a:lnSpc>
+            </a:pPr>
+            <a:endParaRPr lang="en-US" sz="4400" dirty="0"/>
+          </a:p>
+          <a:p>
+            <a:pPr>
+              <a:lnSpc>
+                <a:spcPct val="80000"/>
+              </a:lnSpc>
+            </a:pPr>
+            <a:endParaRPr lang="en-US" sz="4400" dirty="0" smtClean="0"/>
+          </a:p>
+          <a:p>
+            <a:pPr>
+              <a:lnSpc>
+                <a:spcPct val="80000"/>
+              </a:lnSpc>
+            </a:pPr>
+            <a:r>
+              <a:rPr lang="en-US" sz="4400" dirty="0"/>
+              <a:t> </a:t>
+            </a:r>
+            <a:r>
+              <a:rPr lang="en-US" sz="4400" dirty="0" smtClean="0"/>
+              <a:t>* convergence is rapid:</a:t>
+            </a:r>
+          </a:p>
+          <a:p>
+            <a:r>
+              <a:rPr lang="en-US" sz="4400" dirty="0" smtClean="0"/>
+              <a:t>  </a:t>
+            </a:r>
+            <a:r>
+              <a:rPr lang="en-US" sz="4400" dirty="0" smtClean="0">
+                <a:solidFill>
+                  <a:srgbClr val="FF00FF"/>
+                </a:solidFill>
+              </a:rPr>
+              <a:t>t</a:t>
+            </a:r>
+            <a:r>
+              <a:rPr lang="en-US" sz="4400" dirty="0" smtClean="0"/>
+              <a:t> is small so    easy </a:t>
+            </a:r>
+            <a:r>
+              <a:rPr lang="en-US" sz="4400" dirty="0"/>
+              <a:t>to compute </a:t>
+            </a:r>
+          </a:p>
+        </p:txBody>
+      </p:sp>
+      <p:sp>
+        <p:nvSpPr>
+          <p:cNvPr id="2" name="Title 1"/>
+          <p:cNvSpPr>
+            <a:spLocks noGrp="1"/>
+          </p:cNvSpPr>
+          <p:nvPr>
+            <p:ph type="title"/>
+          </p:nvPr>
+        </p:nvSpPr>
+        <p:spPr>
+          <a:xfrm>
+            <a:off x="1219200" y="152400"/>
+            <a:ext cx="7472362" cy="1143000"/>
+          </a:xfrm>
+        </p:spPr>
+        <p:txBody>
+          <a:bodyPr/>
+          <a:lstStyle/>
+          <a:p>
+            <a:r>
+              <a:rPr lang="en-US" dirty="0" smtClean="0"/>
+              <a:t>Importance of Super-node</a:t>
+            </a:r>
+            <a:endParaRPr lang="en-US" dirty="0"/>
+          </a:p>
+        </p:txBody>
+      </p:sp>
+      <p:sp>
+        <p:nvSpPr>
+          <p:cNvPr id="4" name="Slide Number Placeholder 3"/>
+          <p:cNvSpPr>
+            <a:spLocks noGrp="1"/>
+          </p:cNvSpPr>
+          <p:nvPr>
+            <p:ph type="sldNum" sz="quarter" idx="12"/>
+          </p:nvPr>
+        </p:nvSpPr>
+        <p:spPr/>
+        <p:txBody>
+          <a:bodyPr/>
+          <a:lstStyle/>
+          <a:p>
+            <a:pPr>
+              <a:defRPr/>
+            </a:pPr>
+            <a:r>
+              <a:rPr lang="en-US" dirty="0" smtClean="0"/>
+              <a:t>page-rank.</a:t>
+            </a:r>
+            <a:fld id="{E877D3CB-F960-BD47-98A7-06971C504846}" type="slidenum">
+              <a:rPr lang="en-US" smtClean="0"/>
+              <a:pPr>
+                <a:defRPr/>
+              </a:pPr>
+              <a:t>9</a:t>
+            </a:fld>
+            <a:endParaRPr lang="en-US" dirty="0" smtClean="0"/>
+          </a:p>
+          <a:p>
+            <a:pPr>
+              <a:defRPr/>
+            </a:pPr>
+            <a:endParaRPr lang="en-US" dirty="0"/>
+          </a:p>
+        </p:txBody>
+      </p:sp>
+      <p:sp>
+        <p:nvSpPr>
+          <p:cNvPr id="5" name="Date Placeholder 4"/>
+          <p:cNvSpPr>
+            <a:spLocks noGrp="1"/>
+          </p:cNvSpPr>
+          <p:nvPr>
+            <p:ph type="dt" sz="half" idx="2"/>
+          </p:nvPr>
+        </p:nvSpPr>
+        <p:spPr/>
+        <p:txBody>
+          <a:bodyPr/>
+          <a:lstStyle/>
+          <a:p>
+            <a:pPr>
+              <a:defRPr/>
+            </a:pPr>
+            <a:r>
+              <a:rPr lang="en-US" smtClean="0"/>
+              <a:t>Albert R Meyer,           December 11, 2013</a:t>
+            </a:r>
+            <a:endParaRPr lang="en-US" dirty="0"/>
+          </a:p>
+        </p:txBody>
+      </p:sp>
+      <p:grpSp>
+        <p:nvGrpSpPr>
+          <p:cNvPr id="7" name="Group 6"/>
+          <p:cNvGrpSpPr/>
+          <p:nvPr/>
+        </p:nvGrpSpPr>
+        <p:grpSpPr>
+          <a:xfrm>
+            <a:off x="7696200" y="1524000"/>
+            <a:ext cx="533400" cy="923330"/>
+            <a:chOff x="7236844" y="3657600"/>
+            <a:chExt cx="533400" cy="923330"/>
+          </a:xfrm>
+        </p:grpSpPr>
+        <p:sp>
+          <p:nvSpPr>
+            <p:cNvPr id="8" name="TextBox 7"/>
+            <p:cNvSpPr txBox="1"/>
+            <p:nvPr/>
+          </p:nvSpPr>
+          <p:spPr>
+            <a:xfrm>
+              <a:off x="7236844" y="3657600"/>
+              <a:ext cx="521785" cy="923330"/>
+            </a:xfrm>
+            <a:prstGeom prst="rect">
+              <a:avLst/>
+            </a:prstGeom>
+            <a:noFill/>
+          </p:spPr>
+          <p:txBody>
+            <a:bodyPr wrap="none" rtlCol="0">
+              <a:spAutoFit/>
+            </a:bodyPr>
+            <a:lstStyle/>
+            <a:p>
+              <a:r>
+                <a:rPr lang="en-US" sz="5400" dirty="0">
+                  <a:solidFill>
+                    <a:srgbClr val="0000FF"/>
+                  </a:solidFill>
+                </a:rPr>
+                <a:t>s</a:t>
+              </a:r>
+              <a:endParaRPr lang="en-US" sz="5400" dirty="0"/>
+            </a:p>
+          </p:txBody>
+        </p:sp>
+        <p:cxnSp>
+          <p:nvCxnSpPr>
+            <p:cNvPr id="9" name="Straight Arrow Connector 8"/>
+            <p:cNvCxnSpPr/>
+            <p:nvPr/>
+          </p:nvCxnSpPr>
+          <p:spPr bwMode="auto">
+            <a:xfrm>
+              <a:off x="7389244" y="3886200"/>
+              <a:ext cx="381000" cy="0"/>
+            </a:xfrm>
+            <a:prstGeom prst="straightConnector1">
+              <a:avLst/>
+            </a:prstGeom>
+            <a:solidFill>
+              <a:schemeClr val="accent1"/>
+            </a:solidFill>
+            <a:ln w="38100" cap="flat" cmpd="sng" algn="ctr">
+              <a:solidFill>
+                <a:srgbClr val="0000FF"/>
+              </a:solidFill>
+              <a:prstDash val="solid"/>
+              <a:round/>
+              <a:headEnd type="none" w="med" len="med"/>
+              <a:tailEnd type="arrow" w="sm" len="sm"/>
+            </a:ln>
+            <a:effectLst/>
+          </p:spPr>
+        </p:cxnSp>
+      </p:grpSp>
+      <p:grpSp>
+        <p:nvGrpSpPr>
+          <p:cNvPr id="10" name="Group 9"/>
+          <p:cNvGrpSpPr/>
+          <p:nvPr/>
+        </p:nvGrpSpPr>
+        <p:grpSpPr>
+          <a:xfrm>
+            <a:off x="7391400" y="2302133"/>
+            <a:ext cx="513782" cy="830997"/>
+            <a:chOff x="7236844" y="3657600"/>
+            <a:chExt cx="513782" cy="830997"/>
+          </a:xfrm>
+        </p:grpSpPr>
+        <p:sp>
+          <p:nvSpPr>
+            <p:cNvPr id="11" name="TextBox 10"/>
+            <p:cNvSpPr txBox="1"/>
+            <p:nvPr/>
+          </p:nvSpPr>
+          <p:spPr>
+            <a:xfrm>
+              <a:off x="7236844" y="3657600"/>
+              <a:ext cx="513782" cy="830997"/>
+            </a:xfrm>
+            <a:prstGeom prst="rect">
+              <a:avLst/>
+            </a:prstGeom>
+            <a:noFill/>
+          </p:spPr>
+          <p:txBody>
+            <a:bodyPr wrap="none" rtlCol="0">
+              <a:spAutoFit/>
+            </a:bodyPr>
+            <a:lstStyle/>
+            <a:p>
+              <a:r>
+                <a:rPr lang="en-US" sz="4800" dirty="0" smtClean="0">
+                  <a:solidFill>
+                    <a:srgbClr val="0000FF"/>
+                  </a:solidFill>
+                </a:rPr>
+                <a:t>p</a:t>
+              </a:r>
+              <a:endParaRPr lang="en-US" sz="4800" dirty="0"/>
+            </a:p>
+          </p:txBody>
+        </p:sp>
+        <p:cxnSp>
+          <p:nvCxnSpPr>
+            <p:cNvPr id="12" name="Straight Arrow Connector 11"/>
+            <p:cNvCxnSpPr/>
+            <p:nvPr/>
+          </p:nvCxnSpPr>
+          <p:spPr bwMode="auto">
+            <a:xfrm>
+              <a:off x="7313044" y="3886200"/>
+              <a:ext cx="381000" cy="0"/>
+            </a:xfrm>
+            <a:prstGeom prst="straightConnector1">
+              <a:avLst/>
+            </a:prstGeom>
+            <a:solidFill>
+              <a:schemeClr val="accent1"/>
+            </a:solidFill>
+            <a:ln w="38100" cap="flat" cmpd="sng" algn="ctr">
+              <a:solidFill>
+                <a:srgbClr val="0000FF"/>
+              </a:solidFill>
+              <a:prstDash val="solid"/>
+              <a:round/>
+              <a:headEnd type="none" w="med" len="med"/>
+              <a:tailEnd type="arrow" w="sm" len="sm"/>
+            </a:ln>
+            <a:effectLst/>
+          </p:spPr>
+        </p:cxnSp>
+      </p:grpSp>
+      <p:grpSp>
+        <p:nvGrpSpPr>
+          <p:cNvPr id="13" name="Group 12"/>
+          <p:cNvGrpSpPr/>
+          <p:nvPr/>
+        </p:nvGrpSpPr>
+        <p:grpSpPr>
+          <a:xfrm>
+            <a:off x="4572000" y="2810470"/>
+            <a:ext cx="533400" cy="923330"/>
+            <a:chOff x="7236844" y="3657600"/>
+            <a:chExt cx="533400" cy="923330"/>
+          </a:xfrm>
+        </p:grpSpPr>
+        <p:sp>
+          <p:nvSpPr>
+            <p:cNvPr id="14" name="TextBox 13"/>
+            <p:cNvSpPr txBox="1"/>
+            <p:nvPr/>
+          </p:nvSpPr>
+          <p:spPr>
+            <a:xfrm>
+              <a:off x="7236844" y="3657600"/>
+              <a:ext cx="521785" cy="923330"/>
+            </a:xfrm>
+            <a:prstGeom prst="rect">
+              <a:avLst/>
+            </a:prstGeom>
+            <a:noFill/>
+          </p:spPr>
+          <p:txBody>
+            <a:bodyPr wrap="none" rtlCol="0">
+              <a:spAutoFit/>
+            </a:bodyPr>
+            <a:lstStyle/>
+            <a:p>
+              <a:r>
+                <a:rPr lang="en-US" sz="5400" dirty="0">
+                  <a:solidFill>
+                    <a:srgbClr val="0000FF"/>
+                  </a:solidFill>
+                </a:rPr>
+                <a:t>s</a:t>
+              </a:r>
+              <a:endParaRPr lang="en-US" sz="5400" dirty="0"/>
+            </a:p>
+          </p:txBody>
+        </p:sp>
+        <p:cxnSp>
+          <p:nvCxnSpPr>
+            <p:cNvPr id="15" name="Straight Arrow Connector 14"/>
+            <p:cNvCxnSpPr/>
+            <p:nvPr/>
+          </p:nvCxnSpPr>
+          <p:spPr bwMode="auto">
+            <a:xfrm>
+              <a:off x="7389244" y="3886200"/>
+              <a:ext cx="381000" cy="0"/>
+            </a:xfrm>
+            <a:prstGeom prst="straightConnector1">
+              <a:avLst/>
+            </a:prstGeom>
+            <a:solidFill>
+              <a:schemeClr val="accent1"/>
+            </a:solidFill>
+            <a:ln w="38100" cap="flat" cmpd="sng" algn="ctr">
+              <a:solidFill>
+                <a:srgbClr val="0000FF"/>
+              </a:solidFill>
+              <a:prstDash val="solid"/>
+              <a:round/>
+              <a:headEnd type="none" w="med" len="med"/>
+              <a:tailEnd type="arrow" w="sm" len="sm"/>
+            </a:ln>
+            <a:effectLst/>
+          </p:spPr>
+        </p:cxnSp>
+      </p:grpSp>
+      <p:grpSp>
+        <p:nvGrpSpPr>
+          <p:cNvPr id="23" name="Group 22"/>
+          <p:cNvGrpSpPr/>
+          <p:nvPr/>
+        </p:nvGrpSpPr>
+        <p:grpSpPr>
+          <a:xfrm>
+            <a:off x="3303588" y="3124200"/>
+            <a:ext cx="3751262" cy="1600200"/>
+            <a:chOff x="2541588" y="3352800"/>
+            <a:chExt cx="3751262" cy="1600200"/>
+          </a:xfrm>
+        </p:grpSpPr>
+        <p:graphicFrame>
+          <p:nvGraphicFramePr>
+            <p:cNvPr id="17" name="Object 16"/>
+            <p:cNvGraphicFramePr>
+              <a:graphicFrameLocks noChangeAspect="1"/>
+            </p:cNvGraphicFramePr>
+            <p:nvPr>
+              <p:extLst>
+                <p:ext uri="{D42A27DB-BD31-4B8C-83A1-F6EECF244321}">
+                  <p14:modId xmlns:p14="http://schemas.microsoft.com/office/powerpoint/2010/main" val="175687491"/>
+                </p:ext>
+              </p:extLst>
+            </p:nvPr>
+          </p:nvGraphicFramePr>
+          <p:xfrm>
+            <a:off x="2541588" y="3352800"/>
+            <a:ext cx="3751262" cy="1600200"/>
+          </p:xfrm>
+          <a:graphic>
+            <a:graphicData uri="http://schemas.openxmlformats.org/presentationml/2006/ole">
+              <mc:AlternateContent xmlns:mc="http://schemas.openxmlformats.org/markup-compatibility/2006">
+                <mc:Choice xmlns:v="urn:schemas-microsoft-com:vml" Requires="v">
+                  <p:oleObj spid="_x0000_s1038" name="Equation" r:id="rId3" imgW="952500" imgH="406400" progId="Equation.DSMT4">
+                    <p:embed/>
+                  </p:oleObj>
+                </mc:Choice>
+                <mc:Fallback>
+                  <p:oleObj name="Equation" r:id="rId3" imgW="952500" imgH="406400" progId="Equation.DSMT4">
+                    <p:embed/>
+                    <p:pic>
+                      <p:nvPicPr>
+                        <p:cNvPr id="0" name=""/>
+                        <p:cNvPicPr/>
+                        <p:nvPr/>
+                      </p:nvPicPr>
+                      <p:blipFill>
+                        <a:blip r:embed="rId4"/>
+                        <a:stretch>
+                          <a:fillRect/>
+                        </a:stretch>
+                      </p:blipFill>
+                      <p:spPr>
+                        <a:xfrm>
+                          <a:off x="2541588" y="3352800"/>
+                          <a:ext cx="3751262" cy="1600200"/>
+                        </a:xfrm>
+                        <a:prstGeom prst="rect">
+                          <a:avLst/>
+                        </a:prstGeom>
+                      </p:spPr>
+                    </p:pic>
+                  </p:oleObj>
+                </mc:Fallback>
+              </mc:AlternateContent>
+            </a:graphicData>
+          </a:graphic>
+        </p:graphicFrame>
+        <p:cxnSp>
+          <p:nvCxnSpPr>
+            <p:cNvPr id="18" name="Straight Arrow Connector 17"/>
+            <p:cNvCxnSpPr/>
+            <p:nvPr/>
+          </p:nvCxnSpPr>
+          <p:spPr bwMode="auto">
+            <a:xfrm>
+              <a:off x="3657600" y="3962400"/>
+              <a:ext cx="381000" cy="0"/>
+            </a:xfrm>
+            <a:prstGeom prst="straightConnector1">
+              <a:avLst/>
+            </a:prstGeom>
+            <a:solidFill>
+              <a:schemeClr val="accent1"/>
+            </a:solidFill>
+            <a:ln w="38100" cap="flat" cmpd="sng" algn="ctr">
+              <a:solidFill>
+                <a:srgbClr val="0000FF"/>
+              </a:solidFill>
+              <a:prstDash val="solid"/>
+              <a:round/>
+              <a:headEnd type="none" w="med" len="med"/>
+              <a:tailEnd type="arrow" w="sm" len="sm"/>
+            </a:ln>
+            <a:effectLst/>
+          </p:spPr>
+        </p:cxnSp>
+        <p:cxnSp>
+          <p:nvCxnSpPr>
+            <p:cNvPr id="19" name="Straight Arrow Connector 18"/>
+            <p:cNvCxnSpPr/>
+            <p:nvPr/>
+          </p:nvCxnSpPr>
+          <p:spPr bwMode="auto">
+            <a:xfrm>
+              <a:off x="5867400" y="3962400"/>
+              <a:ext cx="381000" cy="0"/>
+            </a:xfrm>
+            <a:prstGeom prst="straightConnector1">
+              <a:avLst/>
+            </a:prstGeom>
+            <a:solidFill>
+              <a:schemeClr val="accent1"/>
+            </a:solidFill>
+            <a:ln w="38100" cap="flat" cmpd="sng" algn="ctr">
+              <a:solidFill>
+                <a:srgbClr val="0000FF"/>
+              </a:solidFill>
+              <a:prstDash val="solid"/>
+              <a:round/>
+              <a:headEnd type="none" w="med" len="med"/>
+              <a:tailEnd type="arrow" w="sm" len="sm"/>
+            </a:ln>
+            <a:effectLst/>
+          </p:spPr>
+        </p:cxnSp>
+      </p:grpSp>
+      <p:grpSp>
+        <p:nvGrpSpPr>
+          <p:cNvPr id="20" name="Group 19"/>
+          <p:cNvGrpSpPr/>
+          <p:nvPr/>
+        </p:nvGrpSpPr>
+        <p:grpSpPr>
+          <a:xfrm>
+            <a:off x="3733800" y="5029200"/>
+            <a:ext cx="533400" cy="923330"/>
+            <a:chOff x="7236844" y="3657600"/>
+            <a:chExt cx="533400" cy="923330"/>
+          </a:xfrm>
+        </p:grpSpPr>
+        <p:sp>
+          <p:nvSpPr>
+            <p:cNvPr id="21" name="TextBox 20"/>
+            <p:cNvSpPr txBox="1"/>
+            <p:nvPr/>
+          </p:nvSpPr>
+          <p:spPr>
+            <a:xfrm>
+              <a:off x="7236844" y="3657600"/>
+              <a:ext cx="521785" cy="923330"/>
+            </a:xfrm>
+            <a:prstGeom prst="rect">
+              <a:avLst/>
+            </a:prstGeom>
+            <a:noFill/>
+          </p:spPr>
+          <p:txBody>
+            <a:bodyPr wrap="none" rtlCol="0">
+              <a:spAutoFit/>
+            </a:bodyPr>
+            <a:lstStyle/>
+            <a:p>
+              <a:r>
+                <a:rPr lang="en-US" sz="5400" dirty="0">
+                  <a:solidFill>
+                    <a:srgbClr val="0000FF"/>
+                  </a:solidFill>
+                </a:rPr>
+                <a:t>s</a:t>
+              </a:r>
+              <a:endParaRPr lang="en-US" sz="5400" dirty="0"/>
+            </a:p>
+          </p:txBody>
+        </p:sp>
+        <p:cxnSp>
+          <p:nvCxnSpPr>
+            <p:cNvPr id="22" name="Straight Arrow Connector 21"/>
+            <p:cNvCxnSpPr/>
+            <p:nvPr/>
+          </p:nvCxnSpPr>
+          <p:spPr bwMode="auto">
+            <a:xfrm>
+              <a:off x="7389244" y="3886200"/>
+              <a:ext cx="381000" cy="0"/>
+            </a:xfrm>
+            <a:prstGeom prst="straightConnector1">
+              <a:avLst/>
+            </a:prstGeom>
+            <a:solidFill>
+              <a:schemeClr val="accent1"/>
+            </a:solidFill>
+            <a:ln w="38100" cap="flat" cmpd="sng" algn="ctr">
+              <a:solidFill>
+                <a:srgbClr val="0000FF"/>
+              </a:solidFill>
+              <a:prstDash val="solid"/>
+              <a:round/>
+              <a:headEnd type="none" w="med" len="med"/>
+              <a:tailEnd type="arrow" w="sm" len="sm"/>
+            </a:ln>
+            <a:effectLst/>
+          </p:spPr>
+        </p:cxnSp>
+      </p:grpSp>
+    </p:spTree>
+    <p:extLst>
+      <p:ext uri="{BB962C8B-B14F-4D97-AF65-F5344CB8AC3E}">
+        <p14:creationId xmlns:p14="http://schemas.microsoft.com/office/powerpoint/2010/main" val="4034444194"/>
+      </p:ext>
+    </p:extLst>
+  </p:cSld>
+  <p:clrMapOvr>
+    <a:masterClrMapping/>
+  </p:clrMapOvr>
+  <p:transition xmlns:p14="http://schemas.microsoft.com/office/powerpoint/2010/main" spd="slow" advClick="0">
+    <p:fade thruBlk="1"/>
+  </p:transition>
+  <p:timing>
+    <p:tnLst>
+      <p:par>
+        <p:cTn xmlns:p14="http://schemas.microsoft.com/office/powerpoint/2010/main" id="1" dur="indefinite" restart="never" nodeType="tmRoot">
+          <p:childTnLst>
+            <p:seq concurrent="1" nextAc="seek">
+              <p:cTn id="2" dur="indefinite" nodeType="mainSeq">
+                <p:childTnLst>
+                  <p:par>
+                    <p:cTn id="3" fill="hold">
+                      <p:stCondLst>
+                        <p:cond delay="indefinite"/>
+                      </p:stCondLst>
+                      <p:childTnLst>
+                        <p:par>
+                          <p:cTn id="4" fill="hold">
+                            <p:stCondLst>
+                              <p:cond delay="0"/>
+                            </p:stCondLst>
+                            <p:childTnLst>
+                              <p:par>
+                                <p:cTn id="5" presetID="10" presetClass="entr" presetSubtype="0" fill="hold" nodeType="clickEffect">
+                                  <p:stCondLst>
+                                    <p:cond delay="0"/>
+                                  </p:stCondLst>
+                                  <p:childTnLst>
+                                    <p:set>
+                                      <p:cBhvr>
+                                        <p:cTn id="6" dur="1" fill="hold">
+                                          <p:stCondLst>
+                                            <p:cond delay="0"/>
+                                          </p:stCondLst>
+                                        </p:cTn>
+                                        <p:tgtEl>
+                                          <p:spTgt spid="6">
+                                            <p:txEl>
+                                              <p:pRg st="1" end="1"/>
+                                            </p:txEl>
+                                          </p:spTgt>
+                                        </p:tgtEl>
+                                        <p:attrNameLst>
+                                          <p:attrName>style.visibility</p:attrName>
+                                        </p:attrNameLst>
+                                      </p:cBhvr>
+                                      <p:to>
+                                        <p:strVal val="visible"/>
+                                      </p:to>
+                                    </p:set>
+                                    <p:animEffect transition="in" filter="fade">
+                                      <p:cBhvr>
+                                        <p:cTn id="7" dur="500"/>
+                                        <p:tgtEl>
+                                          <p:spTgt spid="6">
+                                            <p:txEl>
+                                              <p:pRg st="1" end="1"/>
+                                            </p:txEl>
+                                          </p:spTgt>
+                                        </p:tgtEl>
+                                      </p:cBhvr>
+                                    </p:animEffect>
+                                  </p:childTnLst>
+                                </p:cTn>
+                              </p:par>
+                              <p:par>
+                                <p:cTn id="8" presetID="10" presetClass="entr" presetSubtype="0" fill="hold" nodeType="withEffect">
+                                  <p:stCondLst>
+                                    <p:cond delay="0"/>
+                                  </p:stCondLst>
+                                  <p:childTnLst>
+                                    <p:set>
+                                      <p:cBhvr>
+                                        <p:cTn id="9" dur="1" fill="hold">
+                                          <p:stCondLst>
+                                            <p:cond delay="0"/>
+                                          </p:stCondLst>
+                                        </p:cTn>
+                                        <p:tgtEl>
+                                          <p:spTgt spid="7"/>
+                                        </p:tgtEl>
+                                        <p:attrNameLst>
+                                          <p:attrName>style.visibility</p:attrName>
+                                        </p:attrNameLst>
+                                      </p:cBhvr>
+                                      <p:to>
+                                        <p:strVal val="visible"/>
+                                      </p:to>
+                                    </p:set>
+                                    <p:animEffect transition="in" filter="fade">
+                                      <p:cBhvr>
+                                        <p:cTn id="10" dur="1000"/>
+                                        <p:tgtEl>
+                                          <p:spTgt spid="7"/>
+                                        </p:tgtEl>
+                                      </p:cBhvr>
+                                    </p:animEffect>
+                                  </p:childTnLst>
+                                </p:cTn>
+                              </p:par>
+                            </p:childTnLst>
+                          </p:cTn>
+                        </p:par>
+                      </p:childTnLst>
+                    </p:cTn>
+                  </p:par>
+                  <p:par>
+                    <p:cTn id="11" fill="hold">
+                      <p:stCondLst>
+                        <p:cond delay="indefinite"/>
+                      </p:stCondLst>
+                      <p:childTnLst>
+                        <p:par>
+                          <p:cTn id="12" fill="hold">
+                            <p:stCondLst>
+                              <p:cond delay="0"/>
+                            </p:stCondLst>
+                            <p:childTnLst>
+                              <p:par>
+                                <p:cTn id="13" presetID="10" presetClass="entr" presetSubtype="0" fill="hold" nodeType="clickEffect">
+                                  <p:stCondLst>
+                                    <p:cond delay="0"/>
+                                  </p:stCondLst>
+                                  <p:childTnLst>
+                                    <p:set>
+                                      <p:cBhvr>
+                                        <p:cTn id="14" dur="1" fill="hold">
+                                          <p:stCondLst>
+                                            <p:cond delay="0"/>
+                                          </p:stCondLst>
+                                        </p:cTn>
+                                        <p:tgtEl>
+                                          <p:spTgt spid="6">
+                                            <p:txEl>
+                                              <p:pRg st="2" end="2"/>
+                                            </p:txEl>
+                                          </p:spTgt>
+                                        </p:tgtEl>
+                                        <p:attrNameLst>
+                                          <p:attrName>style.visibility</p:attrName>
+                                        </p:attrNameLst>
+                                      </p:cBhvr>
+                                      <p:to>
+                                        <p:strVal val="visible"/>
+                                      </p:to>
+                                    </p:set>
+                                    <p:animEffect transition="in" filter="fade">
+                                      <p:cBhvr>
+                                        <p:cTn id="15" dur="500"/>
+                                        <p:tgtEl>
+                                          <p:spTgt spid="6">
+                                            <p:txEl>
+                                              <p:pRg st="2" end="2"/>
+                                            </p:txEl>
+                                          </p:spTgt>
+                                        </p:tgtEl>
+                                      </p:cBhvr>
+                                    </p:animEffect>
+                                  </p:childTnLst>
+                                </p:cTn>
+                              </p:par>
+                              <p:par>
+                                <p:cTn id="16" presetID="10" presetClass="entr" presetSubtype="0" fill="hold" nodeType="withEffect">
+                                  <p:stCondLst>
+                                    <p:cond delay="0"/>
+                                  </p:stCondLst>
+                                  <p:childTnLst>
+                                    <p:set>
+                                      <p:cBhvr>
+                                        <p:cTn id="17" dur="1" fill="hold">
+                                          <p:stCondLst>
+                                            <p:cond delay="0"/>
+                                          </p:stCondLst>
+                                        </p:cTn>
+                                        <p:tgtEl>
+                                          <p:spTgt spid="10"/>
+                                        </p:tgtEl>
+                                        <p:attrNameLst>
+                                          <p:attrName>style.visibility</p:attrName>
+                                        </p:attrNameLst>
+                                      </p:cBhvr>
+                                      <p:to>
+                                        <p:strVal val="visible"/>
+                                      </p:to>
+                                    </p:set>
+                                    <p:animEffect transition="in" filter="fade">
+                                      <p:cBhvr>
+                                        <p:cTn id="18" dur="1000"/>
+                                        <p:tgtEl>
+                                          <p:spTgt spid="10"/>
+                                        </p:tgtEl>
+                                      </p:cBhvr>
+                                    </p:animEffect>
+                                  </p:childTnLst>
+                                </p:cTn>
+                              </p:par>
+                            </p:childTnLst>
+                          </p:cTn>
+                        </p:par>
+                        <p:par>
+                          <p:cTn id="19" fill="hold">
+                            <p:stCondLst>
+                              <p:cond delay="1000"/>
+                            </p:stCondLst>
+                            <p:childTnLst>
+                              <p:par>
+                                <p:cTn id="20" presetID="10" presetClass="entr" presetSubtype="0" fill="hold" nodeType="afterEffect">
+                                  <p:stCondLst>
+                                    <p:cond delay="0"/>
+                                  </p:stCondLst>
+                                  <p:childTnLst>
+                                    <p:set>
+                                      <p:cBhvr>
+                                        <p:cTn id="21" dur="1" fill="hold">
+                                          <p:stCondLst>
+                                            <p:cond delay="0"/>
+                                          </p:stCondLst>
+                                        </p:cTn>
+                                        <p:tgtEl>
+                                          <p:spTgt spid="6">
+                                            <p:txEl>
+                                              <p:pRg st="3" end="3"/>
+                                            </p:txEl>
+                                          </p:spTgt>
+                                        </p:tgtEl>
+                                        <p:attrNameLst>
+                                          <p:attrName>style.visibility</p:attrName>
+                                        </p:attrNameLst>
+                                      </p:cBhvr>
+                                      <p:to>
+                                        <p:strVal val="visible"/>
+                                      </p:to>
+                                    </p:set>
+                                    <p:animEffect transition="in" filter="fade">
+                                      <p:cBhvr>
+                                        <p:cTn id="22" dur="500"/>
+                                        <p:tgtEl>
+                                          <p:spTgt spid="6">
+                                            <p:txEl>
+                                              <p:pRg st="3" end="3"/>
+                                            </p:txEl>
+                                          </p:spTgt>
+                                        </p:tgtEl>
+                                      </p:cBhvr>
+                                    </p:animEffect>
+                                  </p:childTnLst>
+                                </p:cTn>
+                              </p:par>
+                              <p:par>
+                                <p:cTn id="23" presetID="10" presetClass="entr" presetSubtype="0" fill="hold" nodeType="withEffect">
+                                  <p:stCondLst>
+                                    <p:cond delay="0"/>
+                                  </p:stCondLst>
+                                  <p:childTnLst>
+                                    <p:set>
+                                      <p:cBhvr>
+                                        <p:cTn id="24" dur="1" fill="hold">
+                                          <p:stCondLst>
+                                            <p:cond delay="0"/>
+                                          </p:stCondLst>
+                                        </p:cTn>
+                                        <p:tgtEl>
+                                          <p:spTgt spid="13"/>
+                                        </p:tgtEl>
+                                        <p:attrNameLst>
+                                          <p:attrName>style.visibility</p:attrName>
+                                        </p:attrNameLst>
+                                      </p:cBhvr>
+                                      <p:to>
+                                        <p:strVal val="visible"/>
+                                      </p:to>
+                                    </p:set>
+                                    <p:animEffect transition="in" filter="fade">
+                                      <p:cBhvr>
+                                        <p:cTn id="25" dur="500"/>
+                                        <p:tgtEl>
+                                          <p:spTgt spid="13"/>
+                                        </p:tgtEl>
+                                      </p:cBhvr>
+                                    </p:animEffect>
+                                  </p:childTnLst>
+                                </p:cTn>
+                              </p:par>
+                            </p:childTnLst>
+                          </p:cTn>
+                        </p:par>
+                      </p:childTnLst>
+                    </p:cTn>
+                  </p:par>
+                  <p:par>
+                    <p:cTn id="26" fill="hold">
+                      <p:stCondLst>
+                        <p:cond delay="indefinite"/>
+                      </p:stCondLst>
+                      <p:childTnLst>
+                        <p:par>
+                          <p:cTn id="27" fill="hold">
+                            <p:stCondLst>
+                              <p:cond delay="0"/>
+                            </p:stCondLst>
+                            <p:childTnLst>
+                              <p:par>
+                                <p:cTn id="28" presetID="22" presetClass="entr" presetSubtype="8" fill="hold" nodeType="clickEffect">
+                                  <p:stCondLst>
+                                    <p:cond delay="0"/>
+                                  </p:stCondLst>
+                                  <p:childTnLst>
+                                    <p:set>
+                                      <p:cBhvr>
+                                        <p:cTn id="29" dur="1" fill="hold">
+                                          <p:stCondLst>
+                                            <p:cond delay="0"/>
+                                          </p:stCondLst>
+                                        </p:cTn>
+                                        <p:tgtEl>
+                                          <p:spTgt spid="23"/>
+                                        </p:tgtEl>
+                                        <p:attrNameLst>
+                                          <p:attrName>style.visibility</p:attrName>
+                                        </p:attrNameLst>
+                                      </p:cBhvr>
+                                      <p:to>
+                                        <p:strVal val="visible"/>
+                                      </p:to>
+                                    </p:set>
+                                    <p:animEffect transition="in" filter="wipe(left)">
+                                      <p:cBhvr>
+                                        <p:cTn id="30" dur="1000"/>
+                                        <p:tgtEl>
+                                          <p:spTgt spid="23"/>
+                                        </p:tgtEl>
+                                      </p:cBhvr>
+                                    </p:animEffect>
+                                  </p:childTnLst>
+                                </p:cTn>
+                              </p:par>
+                            </p:childTnLst>
+                          </p:cTn>
+                        </p:par>
+                      </p:childTnLst>
+                    </p:cTn>
+                  </p:par>
+                  <p:par>
+                    <p:cTn id="31" fill="hold">
+                      <p:stCondLst>
+                        <p:cond delay="indefinite"/>
+                      </p:stCondLst>
+                      <p:childTnLst>
+                        <p:par>
+                          <p:cTn id="32" fill="hold">
+                            <p:stCondLst>
+                              <p:cond delay="0"/>
+                            </p:stCondLst>
+                            <p:childTnLst>
+                              <p:par>
+                                <p:cTn id="33" presetID="10" presetClass="entr" presetSubtype="0" fill="hold" nodeType="clickEffect">
+                                  <p:stCondLst>
+                                    <p:cond delay="0"/>
+                                  </p:stCondLst>
+                                  <p:childTnLst>
+                                    <p:set>
+                                      <p:cBhvr>
+                                        <p:cTn id="34" dur="1" fill="hold">
+                                          <p:stCondLst>
+                                            <p:cond delay="0"/>
+                                          </p:stCondLst>
+                                        </p:cTn>
+                                        <p:tgtEl>
+                                          <p:spTgt spid="6">
+                                            <p:txEl>
+                                              <p:pRg st="6" end="6"/>
+                                            </p:txEl>
+                                          </p:spTgt>
+                                        </p:tgtEl>
+                                        <p:attrNameLst>
+                                          <p:attrName>style.visibility</p:attrName>
+                                        </p:attrNameLst>
+                                      </p:cBhvr>
+                                      <p:to>
+                                        <p:strVal val="visible"/>
+                                      </p:to>
+                                    </p:set>
+                                    <p:animEffect transition="in" filter="fade">
+                                      <p:cBhvr>
+                                        <p:cTn id="35" dur="500"/>
+                                        <p:tgtEl>
+                                          <p:spTgt spid="6">
+                                            <p:txEl>
+                                              <p:pRg st="6" end="6"/>
+                                            </p:txEl>
+                                          </p:spTgt>
+                                        </p:tgtEl>
+                                      </p:cBhvr>
+                                    </p:animEffect>
+                                  </p:childTnLst>
+                                </p:cTn>
+                              </p:par>
+                            </p:childTnLst>
+                          </p:cTn>
+                        </p:par>
+                        <p:par>
+                          <p:cTn id="36" fill="hold">
+                            <p:stCondLst>
+                              <p:cond delay="500"/>
+                            </p:stCondLst>
+                            <p:childTnLst>
+                              <p:par>
+                                <p:cTn id="37" presetID="10" presetClass="entr" presetSubtype="0" fill="hold" nodeType="afterEffect">
+                                  <p:stCondLst>
+                                    <p:cond delay="0"/>
+                                  </p:stCondLst>
+                                  <p:childTnLst>
+                                    <p:set>
+                                      <p:cBhvr>
+                                        <p:cTn id="38" dur="1" fill="hold">
+                                          <p:stCondLst>
+                                            <p:cond delay="0"/>
+                                          </p:stCondLst>
+                                        </p:cTn>
+                                        <p:tgtEl>
+                                          <p:spTgt spid="6">
+                                            <p:txEl>
+                                              <p:pRg st="7" end="7"/>
+                                            </p:txEl>
+                                          </p:spTgt>
+                                        </p:tgtEl>
+                                        <p:attrNameLst>
+                                          <p:attrName>style.visibility</p:attrName>
+                                        </p:attrNameLst>
+                                      </p:cBhvr>
+                                      <p:to>
+                                        <p:strVal val="visible"/>
+                                      </p:to>
+                                    </p:set>
+                                    <p:animEffect transition="in" filter="fade">
+                                      <p:cBhvr>
+                                        <p:cTn id="39" dur="500"/>
+                                        <p:tgtEl>
+                                          <p:spTgt spid="6">
+                                            <p:txEl>
+                                              <p:pRg st="7" end="7"/>
+                                            </p:txEl>
+                                          </p:spTgt>
+                                        </p:tgtEl>
+                                      </p:cBhvr>
+                                    </p:animEffect>
+                                  </p:childTnLst>
+                                </p:cTn>
+                              </p:par>
+                              <p:par>
+                                <p:cTn id="40" presetID="10" presetClass="entr" presetSubtype="0" fill="hold" nodeType="withEffect">
+                                  <p:stCondLst>
+                                    <p:cond delay="0"/>
+                                  </p:stCondLst>
+                                  <p:childTnLst>
+                                    <p:set>
+                                      <p:cBhvr>
+                                        <p:cTn id="41" dur="1" fill="hold">
+                                          <p:stCondLst>
+                                            <p:cond delay="0"/>
+                                          </p:stCondLst>
+                                        </p:cTn>
+                                        <p:tgtEl>
+                                          <p:spTgt spid="20"/>
+                                        </p:tgtEl>
+                                        <p:attrNameLst>
+                                          <p:attrName>style.visibility</p:attrName>
+                                        </p:attrNameLst>
+                                      </p:cBhvr>
+                                      <p:to>
+                                        <p:strVal val="visible"/>
+                                      </p:to>
+                                    </p:set>
+                                    <p:animEffect transition="in" filter="fade">
+                                      <p:cBhvr>
+                                        <p:cTn id="42" dur="1000"/>
+                                        <p:tgtEl>
+                                          <p:spTgt spid="20"/>
+                                        </p:tgtEl>
+                                      </p:cBhvr>
+                                    </p:animEffect>
+                                  </p:childTnLst>
+                                </p:cTn>
+                              </p:par>
+                            </p:childTnLst>
+                          </p:cTn>
+                        </p:par>
+                      </p:childTnLst>
+                    </p:cTn>
+                  </p:par>
+                </p:childTnLst>
+              </p:cTn>
+              <p:prevCondLst>
+                <p:cond evt="onPrev" delay="0">
+                  <p:tgtEl>
+                    <p:sldTgt/>
+                  </p:tgtEl>
+                </p:cond>
+              </p:prevCondLst>
+              <p:nextCondLst>
+                <p:cond evt="onNext" delay="0">
+                  <p:tgtEl>
+                    <p:sldTgt/>
+                  </p:tgtEl>
+                </p:cond>
+              </p:nextCondLst>
+            </p:seq>
+          </p:childTnLst>
+        </p:cTn>
       </p:par>
     </p:tnLst>
   </p:timing>

</xml_diff>